<commit_message>
update: ppt and algorithm generate_array.py
</commit_message>
<xml_diff>
--- a/Introduction to cython.pptx
+++ b/Introduction to cython.pptx
@@ -5,10 +5,10 @@
     <p:sldMasterId id="2147483648" r:id="rId1"/>
   </p:sldMasterIdLst>
   <p:notesMasterIdLst>
-    <p:notesMasterId r:id="rId23"/>
+    <p:notesMasterId r:id="rId22"/>
   </p:notesMasterIdLst>
   <p:handoutMasterIdLst>
-    <p:handoutMasterId r:id="rId24"/>
+    <p:handoutMasterId r:id="rId23"/>
   </p:handoutMasterIdLst>
   <p:sldIdLst>
     <p:sldId id="256" r:id="rId2"/>
@@ -24,14 +24,13 @@
     <p:sldId id="262" r:id="rId12"/>
     <p:sldId id="273" r:id="rId13"/>
     <p:sldId id="277" r:id="rId14"/>
-    <p:sldId id="263" r:id="rId15"/>
-    <p:sldId id="268" r:id="rId16"/>
-    <p:sldId id="264" r:id="rId17"/>
-    <p:sldId id="271" r:id="rId18"/>
-    <p:sldId id="279" r:id="rId19"/>
-    <p:sldId id="274" r:id="rId20"/>
-    <p:sldId id="278" r:id="rId21"/>
-    <p:sldId id="272" r:id="rId22"/>
+    <p:sldId id="268" r:id="rId15"/>
+    <p:sldId id="264" r:id="rId16"/>
+    <p:sldId id="271" r:id="rId17"/>
+    <p:sldId id="279" r:id="rId18"/>
+    <p:sldId id="274" r:id="rId19"/>
+    <p:sldId id="278" r:id="rId20"/>
+    <p:sldId id="272" r:id="rId21"/>
   </p:sldIdLst>
   <p:sldSz cx="12192000" cy="6858000"/>
   <p:notesSz cx="6858000" cy="9144000"/>
@@ -5671,7 +5670,7 @@
           <p:cNvPr id="2" name="標題 1">
             <a:extLst>
               <a:ext uri="{FF2B5EF4-FFF2-40B4-BE49-F238E27FC236}">
-                <a16:creationId xmlns:a16="http://schemas.microsoft.com/office/drawing/2014/main" id="{6D5894FA-32CD-4A2D-91D3-D4A7B14CC23F}"/>
+                <a16:creationId xmlns:a16="http://schemas.microsoft.com/office/drawing/2014/main" id="{0F1F4C0F-3D3E-4083-A659-62A6FD3F61A3}"/>
               </a:ext>
             </a:extLst>
           </p:cNvPr>
@@ -5679,7 +5678,7 @@
             <a:spLocks noGrp="1"/>
           </p:cNvSpPr>
           <p:nvPr>
-            <p:ph type="title"/>
+            <p:ph type="ctrTitle"/>
           </p:nvPr>
         </p:nvSpPr>
         <p:spPr/>
@@ -5689,7 +5688,7 @@
           <a:p>
             <a:r>
               <a:rPr lang="en-US" altLang="zh-TW" dirty="0"/>
-              <a:t>Comparison</a:t>
+              <a:t>My</a:t>
             </a:r>
             <a:r>
               <a:rPr lang="zh-TW" altLang="en-US" dirty="0"/>
@@ -5697,355 +5696,43 @@
             </a:r>
             <a:r>
               <a:rPr lang="en-US" altLang="zh-TW" dirty="0"/>
-              <a:t>of</a:t>
-            </a:r>
-            <a:r>
-              <a:rPr lang="zh-TW" altLang="en-US" dirty="0"/>
-              <a:t> </a:t>
-            </a:r>
-            <a:r>
-              <a:rPr lang="en-US" altLang="zh-TW" dirty="0"/>
-              <a:t>Python,</a:t>
-            </a:r>
-            <a:r>
-              <a:rPr lang="zh-TW" altLang="en-US" dirty="0"/>
-              <a:t> </a:t>
-            </a:r>
-            <a:r>
-              <a:rPr lang="en-US" altLang="zh-TW" dirty="0" err="1"/>
-              <a:t>Cython</a:t>
-            </a:r>
-            <a:r>
-              <a:rPr lang="en-US" altLang="zh-TW" dirty="0"/>
-              <a:t>,</a:t>
-            </a:r>
-            <a:r>
-              <a:rPr lang="zh-TW" altLang="en-US" dirty="0"/>
-              <a:t> </a:t>
-            </a:r>
-            <a:r>
-              <a:rPr lang="en-US" altLang="zh-TW" dirty="0"/>
-              <a:t>and</a:t>
-            </a:r>
-            <a:r>
-              <a:rPr lang="zh-TW" altLang="en-US" dirty="0"/>
-              <a:t> </a:t>
-            </a:r>
-            <a:r>
-              <a:rPr lang="en-US" altLang="zh-TW" dirty="0"/>
-              <a:t>C</a:t>
+              <a:t>Research</a:t>
             </a:r>
             <a:endParaRPr lang="zh-TW" altLang="en-US" dirty="0"/>
           </a:p>
         </p:txBody>
       </p:sp>
-      <p:graphicFrame>
-        <p:nvGraphicFramePr>
-          <p:cNvPr id="5" name="內容版面配置區 4">
-            <a:extLst>
-              <a:ext uri="{FF2B5EF4-FFF2-40B4-BE49-F238E27FC236}">
-                <a16:creationId xmlns:a16="http://schemas.microsoft.com/office/drawing/2014/main" id="{5D2E49E6-3BE7-4394-9380-C4FB2421966B}"/>
-              </a:ext>
-            </a:extLst>
-          </p:cNvPr>
-          <p:cNvGraphicFramePr>
-            <a:graphicFrameLocks noGrp="1"/>
-          </p:cNvGraphicFramePr>
-          <p:nvPr>
-            <p:ph idx="1"/>
-            <p:extLst>
-              <p:ext uri="{D42A27DB-BD31-4B8C-83A1-F6EECF244321}">
-                <p14:modId xmlns:p14="http://schemas.microsoft.com/office/powerpoint/2010/main" val="1259592733"/>
-              </p:ext>
-            </p:extLst>
-          </p:nvPr>
-        </p:nvGraphicFramePr>
-        <p:xfrm>
-          <a:off x="838200" y="1960880"/>
-          <a:ext cx="10515600" cy="1478280"/>
-        </p:xfrm>
-        <a:graphic>
-          <a:graphicData uri="http://schemas.openxmlformats.org/drawingml/2006/table">
-            <a:tbl>
-              <a:tblPr firstRow="1" bandRow="1">
-                <a:tableStyleId>{E8034E78-7F5D-4C2E-B375-FC64B27BC917}</a:tableStyleId>
-              </a:tblPr>
-              <a:tblGrid>
-                <a:gridCol w="2628900">
-                  <a:extLst>
-                    <a:ext uri="{9D8B030D-6E8A-4147-A177-3AD203B41FA5}">
-                      <a16:colId xmlns:a16="http://schemas.microsoft.com/office/drawing/2014/main" val="2039707111"/>
-                    </a:ext>
-                  </a:extLst>
-                </a:gridCol>
-                <a:gridCol w="2628900">
-                  <a:extLst>
-                    <a:ext uri="{9D8B030D-6E8A-4147-A177-3AD203B41FA5}">
-                      <a16:colId xmlns:a16="http://schemas.microsoft.com/office/drawing/2014/main" val="3870017157"/>
-                    </a:ext>
-                  </a:extLst>
-                </a:gridCol>
-                <a:gridCol w="2628900">
-                  <a:extLst>
-                    <a:ext uri="{9D8B030D-6E8A-4147-A177-3AD203B41FA5}">
-                      <a16:colId xmlns:a16="http://schemas.microsoft.com/office/drawing/2014/main" val="431878697"/>
-                    </a:ext>
-                  </a:extLst>
-                </a:gridCol>
-                <a:gridCol w="2628900">
-                  <a:extLst>
-                    <a:ext uri="{9D8B030D-6E8A-4147-A177-3AD203B41FA5}">
-                      <a16:colId xmlns:a16="http://schemas.microsoft.com/office/drawing/2014/main" val="1541847123"/>
-                    </a:ext>
-                  </a:extLst>
-                </a:gridCol>
-              </a:tblGrid>
-              <a:tr h="208439">
-                <a:tc>
-                  <a:txBody>
-                    <a:bodyPr/>
-                    <a:lstStyle/>
-                    <a:p>
-                      <a:endParaRPr lang="zh-TW" altLang="en-US" dirty="0"/>
-                    </a:p>
-                  </a:txBody>
-                  <a:tcPr/>
-                </a:tc>
-                <a:tc>
-                  <a:txBody>
-                    <a:bodyPr/>
-                    <a:lstStyle/>
-                    <a:p>
-                      <a:r>
-                        <a:rPr lang="en-US" altLang="zh-TW" dirty="0"/>
-                        <a:t>Python</a:t>
-                      </a:r>
-                      <a:endParaRPr lang="zh-TW" altLang="en-US" dirty="0"/>
-                    </a:p>
-                  </a:txBody>
-                  <a:tcPr/>
-                </a:tc>
-                <a:tc>
-                  <a:txBody>
-                    <a:bodyPr/>
-                    <a:lstStyle/>
-                    <a:p>
-                      <a:r>
-                        <a:rPr lang="en-US" altLang="zh-TW" dirty="0" err="1"/>
-                        <a:t>Cython</a:t>
-                      </a:r>
-                      <a:endParaRPr lang="zh-TW" altLang="en-US" dirty="0"/>
-                    </a:p>
-                  </a:txBody>
-                  <a:tcPr/>
-                </a:tc>
-                <a:tc>
-                  <a:txBody>
-                    <a:bodyPr/>
-                    <a:lstStyle/>
-                    <a:p>
-                      <a:r>
-                        <a:rPr lang="en-US" altLang="zh-TW" dirty="0"/>
-                        <a:t>C</a:t>
-                      </a:r>
-                      <a:endParaRPr lang="zh-TW" altLang="en-US" dirty="0"/>
-                    </a:p>
-                  </a:txBody>
-                  <a:tcPr/>
-                </a:tc>
-                <a:extLst>
-                  <a:ext uri="{0D108BD9-81ED-4DB2-BD59-A6C34878D82A}">
-                    <a16:rowId xmlns:a16="http://schemas.microsoft.com/office/drawing/2014/main" val="2161144078"/>
-                  </a:ext>
-                </a:extLst>
-              </a:tr>
-              <a:tr h="370840">
-                <a:tc>
-                  <a:txBody>
-                    <a:bodyPr/>
-                    <a:lstStyle/>
-                    <a:p>
-                      <a:r>
-                        <a:rPr lang="en-US" altLang="zh-TW" dirty="0"/>
-                        <a:t>Speed</a:t>
-                      </a:r>
-                      <a:endParaRPr lang="zh-TW" altLang="en-US" dirty="0"/>
-                    </a:p>
-                  </a:txBody>
-                  <a:tcPr/>
-                </a:tc>
-                <a:tc>
-                  <a:txBody>
-                    <a:bodyPr/>
-                    <a:lstStyle/>
-                    <a:p>
-                      <a:r>
-                        <a:rPr lang="en-US" altLang="zh-TW" dirty="0"/>
-                        <a:t>Slow</a:t>
-                      </a:r>
-                      <a:endParaRPr lang="zh-TW" altLang="en-US" dirty="0"/>
-                    </a:p>
-                  </a:txBody>
-                  <a:tcPr/>
-                </a:tc>
-                <a:tc>
-                  <a:txBody>
-                    <a:bodyPr/>
-                    <a:lstStyle/>
-                    <a:p>
-                      <a:r>
-                        <a:rPr lang="en-US" altLang="zh-TW" dirty="0"/>
-                        <a:t>Fast</a:t>
-                      </a:r>
-                      <a:endParaRPr lang="zh-TW" altLang="en-US" dirty="0"/>
-                    </a:p>
-                  </a:txBody>
-                  <a:tcPr/>
-                </a:tc>
-                <a:tc>
-                  <a:txBody>
-                    <a:bodyPr/>
-                    <a:lstStyle/>
-                    <a:p>
-                      <a:r>
-                        <a:rPr lang="en-US" altLang="zh-TW" dirty="0"/>
-                        <a:t>Fastest</a:t>
-                      </a:r>
-                      <a:endParaRPr lang="zh-TW" altLang="en-US" dirty="0"/>
-                    </a:p>
-                  </a:txBody>
-                  <a:tcPr/>
-                </a:tc>
-                <a:extLst>
-                  <a:ext uri="{0D108BD9-81ED-4DB2-BD59-A6C34878D82A}">
-                    <a16:rowId xmlns:a16="http://schemas.microsoft.com/office/drawing/2014/main" val="217364911"/>
-                  </a:ext>
-                </a:extLst>
-              </a:tr>
-              <a:tr h="370840">
-                <a:tc>
-                  <a:txBody>
-                    <a:bodyPr/>
-                    <a:lstStyle/>
-                    <a:p>
-                      <a:r>
-                        <a:rPr lang="en-US" altLang="zh-TW" dirty="0"/>
-                        <a:t>Code</a:t>
-                      </a:r>
-                      <a:r>
-                        <a:rPr lang="zh-TW" altLang="en-US" dirty="0"/>
-                        <a:t> </a:t>
-                      </a:r>
-                      <a:r>
-                        <a:rPr lang="en-US" altLang="zh-TW" dirty="0"/>
-                        <a:t>implementation</a:t>
-                      </a:r>
-                      <a:endParaRPr lang="zh-TW" altLang="en-US" dirty="0"/>
-                    </a:p>
-                  </a:txBody>
-                  <a:tcPr/>
-                </a:tc>
-                <a:tc>
-                  <a:txBody>
-                    <a:bodyPr/>
-                    <a:lstStyle/>
-                    <a:p>
-                      <a:r>
-                        <a:rPr lang="en-US" altLang="zh-TW" dirty="0"/>
-                        <a:t>Easy</a:t>
-                      </a:r>
-                      <a:endParaRPr lang="zh-TW" altLang="en-US" dirty="0"/>
-                    </a:p>
-                  </a:txBody>
-                  <a:tcPr/>
-                </a:tc>
-                <a:tc>
-                  <a:txBody>
-                    <a:bodyPr/>
-                    <a:lstStyle/>
-                    <a:p>
-                      <a:endParaRPr lang="zh-TW" altLang="en-US" dirty="0"/>
-                    </a:p>
-                  </a:txBody>
-                  <a:tcPr/>
-                </a:tc>
-                <a:tc>
-                  <a:txBody>
-                    <a:bodyPr/>
-                    <a:lstStyle/>
-                    <a:p>
-                      <a:r>
-                        <a:rPr lang="en-US" altLang="zh-TW" dirty="0"/>
-                        <a:t>Hard</a:t>
-                      </a:r>
-                      <a:endParaRPr lang="zh-TW" altLang="en-US" dirty="0"/>
-                    </a:p>
-                  </a:txBody>
-                  <a:tcPr/>
-                </a:tc>
-                <a:extLst>
-                  <a:ext uri="{0D108BD9-81ED-4DB2-BD59-A6C34878D82A}">
-                    <a16:rowId xmlns:a16="http://schemas.microsoft.com/office/drawing/2014/main" val="132960330"/>
-                  </a:ext>
-                </a:extLst>
-              </a:tr>
-              <a:tr h="370840">
-                <a:tc>
-                  <a:txBody>
-                    <a:bodyPr/>
-                    <a:lstStyle/>
-                    <a:p>
-                      <a:endParaRPr lang="zh-TW" altLang="en-US" dirty="0"/>
-                    </a:p>
-                  </a:txBody>
-                  <a:tcPr/>
-                </a:tc>
-                <a:tc>
-                  <a:txBody>
-                    <a:bodyPr/>
-                    <a:lstStyle/>
-                    <a:p>
-                      <a:endParaRPr lang="zh-TW" altLang="en-US" dirty="0"/>
-                    </a:p>
-                  </a:txBody>
-                  <a:tcPr/>
-                </a:tc>
-                <a:tc>
-                  <a:txBody>
-                    <a:bodyPr/>
-                    <a:lstStyle/>
-                    <a:p>
-                      <a:endParaRPr lang="zh-TW" altLang="en-US" dirty="0"/>
-                    </a:p>
-                  </a:txBody>
-                  <a:tcPr/>
-                </a:tc>
-                <a:tc>
-                  <a:txBody>
-                    <a:bodyPr/>
-                    <a:lstStyle/>
-                    <a:p>
-                      <a:endParaRPr lang="zh-TW" altLang="en-US" dirty="0"/>
-                    </a:p>
-                  </a:txBody>
-                  <a:tcPr/>
-                </a:tc>
-                <a:extLst>
-                  <a:ext uri="{0D108BD9-81ED-4DB2-BD59-A6C34878D82A}">
-                    <a16:rowId xmlns:a16="http://schemas.microsoft.com/office/drawing/2014/main" val="3048752080"/>
-                  </a:ext>
-                </a:extLst>
-              </a:tr>
-            </a:tbl>
-          </a:graphicData>
-        </a:graphic>
-      </p:graphicFrame>
+      <p:sp>
+        <p:nvSpPr>
+          <p:cNvPr id="3" name="副標題 2">
+            <a:extLst>
+              <a:ext uri="{FF2B5EF4-FFF2-40B4-BE49-F238E27FC236}">
+                <a16:creationId xmlns:a16="http://schemas.microsoft.com/office/drawing/2014/main" id="{4C848A8D-AEFF-49E5-9EC8-F3275AB134B0}"/>
+              </a:ext>
+            </a:extLst>
+          </p:cNvPr>
+          <p:cNvSpPr>
+            <a:spLocks noGrp="1"/>
+          </p:cNvSpPr>
+          <p:nvPr>
+            <p:ph type="subTitle" idx="1"/>
+          </p:nvPr>
+        </p:nvSpPr>
+        <p:spPr/>
+        <p:txBody>
+          <a:bodyPr/>
+          <a:lstStyle/>
+          <a:p>
+            <a:endParaRPr lang="zh-TW" altLang="en-US" dirty="0"/>
+          </a:p>
+        </p:txBody>
+      </p:sp>
       <p:sp>
         <p:nvSpPr>
           <p:cNvPr id="4" name="投影片編號版面配置區 3">
             <a:extLst>
               <a:ext uri="{FF2B5EF4-FFF2-40B4-BE49-F238E27FC236}">
-                <a16:creationId xmlns:a16="http://schemas.microsoft.com/office/drawing/2014/main" id="{AA2AB4FC-1F88-4F37-BFAE-4DFD72161206}"/>
+                <a16:creationId xmlns:a16="http://schemas.microsoft.com/office/drawing/2014/main" id="{E3ADAA93-0FDB-4C1A-AA7F-3B07ECF5402E}"/>
               </a:ext>
             </a:extLst>
           </p:cNvPr>
@@ -6072,7 +5759,7 @@
     </p:spTree>
     <p:extLst>
       <p:ext uri="{BB962C8B-B14F-4D97-AF65-F5344CB8AC3E}">
-        <p14:creationId xmlns:p14="http://schemas.microsoft.com/office/powerpoint/2010/main" val="2526306300"/>
+        <p14:creationId xmlns:p14="http://schemas.microsoft.com/office/powerpoint/2010/main" val="348128361"/>
       </p:ext>
     </p:extLst>
   </p:cSld>
@@ -6116,7 +5803,7 @@
           <p:cNvPr id="2" name="標題 1">
             <a:extLst>
               <a:ext uri="{FF2B5EF4-FFF2-40B4-BE49-F238E27FC236}">
-                <a16:creationId xmlns:a16="http://schemas.microsoft.com/office/drawing/2014/main" id="{0F1F4C0F-3D3E-4083-A659-62A6FD3F61A3}"/>
+                <a16:creationId xmlns:a16="http://schemas.microsoft.com/office/drawing/2014/main" id="{8E75F9D6-92FB-4B07-817C-F519297D5FC4}"/>
               </a:ext>
             </a:extLst>
           </p:cNvPr>
@@ -6124,7 +5811,7 @@
             <a:spLocks noGrp="1"/>
           </p:cNvSpPr>
           <p:nvPr>
-            <p:ph type="ctrTitle"/>
+            <p:ph type="title"/>
           </p:nvPr>
         </p:nvSpPr>
         <p:spPr/>
@@ -6134,7 +5821,7 @@
           <a:p>
             <a:r>
               <a:rPr lang="en-US" altLang="zh-TW" dirty="0"/>
-              <a:t>My</a:t>
+              <a:t>Internal</a:t>
             </a:r>
             <a:r>
               <a:rPr lang="zh-TW" altLang="en-US" dirty="0"/>
@@ -6142,18 +5829,25 @@
             </a:r>
             <a:r>
               <a:rPr lang="en-US" altLang="zh-TW" dirty="0"/>
-              <a:t>Research</a:t>
-            </a:r>
-            <a:endParaRPr lang="zh-TW" altLang="en-US" dirty="0"/>
-          </a:p>
-        </p:txBody>
-      </p:sp>
-      <p:sp>
-        <p:nvSpPr>
-          <p:cNvPr id="3" name="副標題 2">
-            <a:extLst>
-              <a:ext uri="{FF2B5EF4-FFF2-40B4-BE49-F238E27FC236}">
-                <a16:creationId xmlns:a16="http://schemas.microsoft.com/office/drawing/2014/main" id="{4C848A8D-AEFF-49E5-9EC8-F3275AB134B0}"/>
+              <a:t>conversion</a:t>
+            </a:r>
+            <a:r>
+              <a:rPr lang="zh-TW" altLang="en-US" dirty="0"/>
+              <a:t> </a:t>
+            </a:r>
+            <a:r>
+              <a:rPr lang="en-US" altLang="zh-TW" dirty="0"/>
+              <a:t>rate</a:t>
+            </a:r>
+          </a:p>
+        </p:txBody>
+      </p:sp>
+      <p:sp>
+        <p:nvSpPr>
+          <p:cNvPr id="3" name="內容版面配置區 2">
+            <a:extLst>
+              <a:ext uri="{FF2B5EF4-FFF2-40B4-BE49-F238E27FC236}">
+                <a16:creationId xmlns:a16="http://schemas.microsoft.com/office/drawing/2014/main" id="{EBF37545-85BF-4D8C-801F-77D09E847EC6}"/>
               </a:ext>
             </a:extLst>
           </p:cNvPr>
@@ -6161,7 +5855,7 @@
             <a:spLocks noGrp="1"/>
           </p:cNvSpPr>
           <p:nvPr>
-            <p:ph type="subTitle" idx="1"/>
+            <p:ph idx="1"/>
           </p:nvPr>
         </p:nvSpPr>
         <p:spPr/>
@@ -6169,6 +5863,36 @@
           <a:bodyPr/>
           <a:lstStyle/>
           <a:p>
+            <a:r>
+              <a:rPr lang="en-US" altLang="zh-TW" dirty="0"/>
+              <a:t>From</a:t>
+            </a:r>
+            <a:r>
+              <a:rPr lang="zh-TW" altLang="en-US" dirty="0"/>
+              <a:t> </a:t>
+            </a:r>
+            <a:r>
+              <a:rPr lang="en-US" altLang="zh-TW" dirty="0"/>
+              <a:t>Fermi’s</a:t>
+            </a:r>
+            <a:r>
+              <a:rPr lang="zh-TW" altLang="en-US" dirty="0"/>
+              <a:t> </a:t>
+            </a:r>
+            <a:r>
+              <a:rPr lang="en-US" altLang="zh-TW" dirty="0"/>
+              <a:t>golden</a:t>
+            </a:r>
+            <a:r>
+              <a:rPr lang="zh-TW" altLang="en-US" dirty="0"/>
+              <a:t> </a:t>
+            </a:r>
+            <a:r>
+              <a:rPr lang="en-US" altLang="zh-TW" dirty="0"/>
+              <a:t>rule</a:t>
+            </a:r>
+          </a:p>
+          <a:p>
             <a:endParaRPr lang="zh-TW" altLang="en-US" dirty="0"/>
           </a:p>
         </p:txBody>
@@ -6178,7 +5902,7 @@
           <p:cNvPr id="4" name="投影片編號版面配置區 3">
             <a:extLst>
               <a:ext uri="{FF2B5EF4-FFF2-40B4-BE49-F238E27FC236}">
-                <a16:creationId xmlns:a16="http://schemas.microsoft.com/office/drawing/2014/main" id="{E3ADAA93-0FDB-4C1A-AA7F-3B07ECF5402E}"/>
+                <a16:creationId xmlns:a16="http://schemas.microsoft.com/office/drawing/2014/main" id="{A2511B5B-B4B9-467D-81A2-E2973668E703}"/>
               </a:ext>
             </a:extLst>
           </p:cNvPr>
@@ -6202,10 +5926,1349 @@
           </a:p>
         </p:txBody>
       </p:sp>
+      <p:pic>
+        <p:nvPicPr>
+          <p:cNvPr id="5" name="圖片 4" descr="\documentclass{article}&#10;&#10;\pagestyle{empty}&#10;&#10;\usepackage{amsmath}&#10;\usepackage{graphics}&#10;\usepackage{color}&#10;\usepackage{mathtools}&#10;\usepackage{braket}&#10;\usepackage{physics}&#10;&#10;\begin{document}&#10;\begin{align*}&#10;&amp;k^{\mathrm{IC, nr}}_{f \leftarrow i} = \sum_{b = 1}^{3N-6} \frac{\abs{R_b(f \leftarrow i)}^2}{\hbar^2} \frac{\omega_b}{\hbar}&#10;\sum_{\tilde{v}_b} \sum_{{v}_b} {P}_{i {v}_b} \abs{&#10;\sqrt{v_b+1} \bra{ \chi_{f\tilde{v}_b} } \ket{ \chi_{i({v}_b+1)} } - \sqrt{v_b} \bra{ \chi_{f\tilde{v}_b} } \ket{ \chi_{i({v}_b-1)} } &#10;}^2&#10;\\&#10;&amp;\quad \quad \times  \prod_{b' \neq b} &#10;\sum_{\tilde{v}_{b'}} \sum_{{v}_{b'}} {P}_{i {v}_{b'}} \abs{ \bra{ \chi_{f\tilde{v}_{b'}} } \ket{ \chi_{i{v}_{b'}} } }^2&#10;\frac{\Gamma}{&#10;\left[ \omega_{fi} + \sum_{c = 1}^{3N-6} &#10;\left( &#10;(\tilde{v}_c + \frac{1}{2}) \tilde{\omega_c} &#10;- &#10;({v}_c + \frac{1}{2}) {\omega_c}&#10;\right)\right]^2 + \Gamma^2}&#10;\end{align*}&#10;\end{document}" title="IguanaTex Bitmap Display">
+            <a:extLst>
+              <a:ext uri="{FF2B5EF4-FFF2-40B4-BE49-F238E27FC236}">
+                <a16:creationId xmlns:a16="http://schemas.microsoft.com/office/drawing/2014/main" id="{92F8BB81-FD71-4B9D-83A4-41B56DF1E663}"/>
+              </a:ext>
+            </a:extLst>
+          </p:cNvPr>
+          <p:cNvPicPr>
+            <a:picLocks noChangeAspect="1"/>
+          </p:cNvPicPr>
+          <p:nvPr>
+            <p:custDataLst>
+              <p:tags r:id="rId1"/>
+            </p:custDataLst>
+          </p:nvPr>
+        </p:nvPicPr>
+        <p:blipFill>
+          <a:blip r:embed="rId4" cstate="print">
+            <a:extLst>
+              <a:ext uri="{28A0092B-C50C-407E-A947-70E740481C1C}">
+                <a14:useLocalDpi xmlns:a14="http://schemas.microsoft.com/office/drawing/2010/main" val="0"/>
+              </a:ext>
+            </a:extLst>
+          </a:blip>
+          <a:stretch>
+            <a:fillRect/>
+          </a:stretch>
+        </p:blipFill>
+        <p:spPr>
+          <a:xfrm>
+            <a:off x="1023498" y="2824353"/>
+            <a:ext cx="11039852" cy="1920494"/>
+          </a:xfrm>
+          <a:prstGeom prst="rect">
+            <a:avLst/>
+          </a:prstGeom>
+        </p:spPr>
+      </p:pic>
+      <p:sp>
+        <p:nvSpPr>
+          <p:cNvPr id="6" name="矩形: 圓角 5">
+            <a:extLst>
+              <a:ext uri="{FF2B5EF4-FFF2-40B4-BE49-F238E27FC236}">
+                <a16:creationId xmlns:a16="http://schemas.microsoft.com/office/drawing/2014/main" id="{4793EFBF-4F1F-4629-8807-8A92C77252AA}"/>
+              </a:ext>
+            </a:extLst>
+          </p:cNvPr>
+          <p:cNvSpPr/>
+          <p:nvPr/>
+        </p:nvSpPr>
+        <p:spPr>
+          <a:xfrm>
+            <a:off x="1828800" y="3794887"/>
+            <a:ext cx="1524000" cy="863600"/>
+          </a:xfrm>
+          <a:prstGeom prst="roundRect">
+            <a:avLst/>
+          </a:prstGeom>
+          <a:noFill/>
+          <a:ln>
+            <a:solidFill>
+              <a:srgbClr val="FF0000"/>
+            </a:solidFill>
+          </a:ln>
+        </p:spPr>
+        <p:style>
+          <a:lnRef idx="2">
+            <a:schemeClr val="accent1">
+              <a:shade val="50000"/>
+            </a:schemeClr>
+          </a:lnRef>
+          <a:fillRef idx="1">
+            <a:schemeClr val="accent1"/>
+          </a:fillRef>
+          <a:effectRef idx="0">
+            <a:schemeClr val="accent1"/>
+          </a:effectRef>
+          <a:fontRef idx="minor">
+            <a:schemeClr val="lt1"/>
+          </a:fontRef>
+        </p:style>
+        <p:txBody>
+          <a:bodyPr rtlCol="0" anchor="ctr"/>
+          <a:lstStyle/>
+          <a:p>
+            <a:pPr algn="ctr"/>
+            <a:endParaRPr lang="zh-TW" altLang="en-US"/>
+          </a:p>
+        </p:txBody>
+      </p:sp>
+      <p:pic>
+        <p:nvPicPr>
+          <p:cNvPr id="8" name="圖片 7" descr="\documentclass{article}&#10;&#10;\usepackage{amssymb,amsmath,amsthm,amsfonts,physics}&#10;&#10;&#10;\pagestyle{empty}&#10;&#10;\begin{document}&#10;&#10;\begin{align*}&#10;\sum_{x_1}\sum_{x_2}\cdots\sum_{x_n} f(x_1, x_2, \cdots, x_n)&#10;\end{align*}&#10;&#10;\end{document}" title="IguanaTex Bitmap Display">
+            <a:extLst>
+              <a:ext uri="{FF2B5EF4-FFF2-40B4-BE49-F238E27FC236}">
+                <a16:creationId xmlns:a16="http://schemas.microsoft.com/office/drawing/2014/main" id="{B1D9BAE0-E727-490A-8C64-3DD3CCB39A5A}"/>
+              </a:ext>
+            </a:extLst>
+          </p:cNvPr>
+          <p:cNvPicPr>
+            <a:picLocks noChangeAspect="1"/>
+          </p:cNvPicPr>
+          <p:nvPr>
+            <p:custDataLst>
+              <p:tags r:id="rId2"/>
+            </p:custDataLst>
+          </p:nvPr>
+        </p:nvPicPr>
+        <p:blipFill>
+          <a:blip r:embed="rId5">
+            <a:extLst>
+              <a:ext uri="{28A0092B-C50C-407E-A947-70E740481C1C}">
+                <a14:useLocalDpi xmlns:a14="http://schemas.microsoft.com/office/drawing/2010/main" val="0"/>
+              </a:ext>
+            </a:extLst>
+          </a:blip>
+          <a:stretch>
+            <a:fillRect/>
+          </a:stretch>
+        </p:blipFill>
+        <p:spPr>
+          <a:xfrm>
+            <a:off x="3830320" y="5429901"/>
+            <a:ext cx="4531360" cy="747062"/>
+          </a:xfrm>
+          <a:prstGeom prst="rect">
+            <a:avLst/>
+          </a:prstGeom>
+        </p:spPr>
+      </p:pic>
+      <p:sp>
+        <p:nvSpPr>
+          <p:cNvPr id="9" name="矩形: 圓角 8">
+            <a:extLst>
+              <a:ext uri="{FF2B5EF4-FFF2-40B4-BE49-F238E27FC236}">
+                <a16:creationId xmlns:a16="http://schemas.microsoft.com/office/drawing/2014/main" id="{3E95EA31-C14D-4E97-B7B1-A818F2BD20D2}"/>
+              </a:ext>
+            </a:extLst>
+          </p:cNvPr>
+          <p:cNvSpPr/>
+          <p:nvPr/>
+        </p:nvSpPr>
+        <p:spPr>
+          <a:xfrm>
+            <a:off x="4724400" y="2888297"/>
+            <a:ext cx="904240" cy="863600"/>
+          </a:xfrm>
+          <a:prstGeom prst="roundRect">
+            <a:avLst/>
+          </a:prstGeom>
+          <a:noFill/>
+          <a:ln>
+            <a:solidFill>
+              <a:srgbClr val="FF0000"/>
+            </a:solidFill>
+          </a:ln>
+        </p:spPr>
+        <p:style>
+          <a:lnRef idx="2">
+            <a:schemeClr val="accent1">
+              <a:shade val="50000"/>
+            </a:schemeClr>
+          </a:lnRef>
+          <a:fillRef idx="1">
+            <a:schemeClr val="accent1"/>
+          </a:fillRef>
+          <a:effectRef idx="0">
+            <a:schemeClr val="accent1"/>
+          </a:effectRef>
+          <a:fontRef idx="minor">
+            <a:schemeClr val="lt1"/>
+          </a:fontRef>
+        </p:style>
+        <p:txBody>
+          <a:bodyPr rtlCol="0" anchor="ctr"/>
+          <a:lstStyle/>
+          <a:p>
+            <a:pPr algn="ctr"/>
+            <a:endParaRPr lang="zh-TW" altLang="en-US"/>
+          </a:p>
+        </p:txBody>
+      </p:sp>
+      <p:sp>
+        <p:nvSpPr>
+          <p:cNvPr id="10" name="箭號: 向右 9">
+            <a:extLst>
+              <a:ext uri="{FF2B5EF4-FFF2-40B4-BE49-F238E27FC236}">
+                <a16:creationId xmlns:a16="http://schemas.microsoft.com/office/drawing/2014/main" id="{1BCBBAD0-8291-4F1F-A348-880080DCFBEC}"/>
+              </a:ext>
+            </a:extLst>
+          </p:cNvPr>
+          <p:cNvSpPr/>
+          <p:nvPr/>
+        </p:nvSpPr>
+        <p:spPr>
+          <a:xfrm>
+            <a:off x="1582420" y="5537200"/>
+            <a:ext cx="1503680" cy="386080"/>
+          </a:xfrm>
+          <a:prstGeom prst="rightArrow">
+            <a:avLst/>
+          </a:prstGeom>
+        </p:spPr>
+        <p:style>
+          <a:lnRef idx="2">
+            <a:schemeClr val="accent1">
+              <a:shade val="50000"/>
+            </a:schemeClr>
+          </a:lnRef>
+          <a:fillRef idx="1">
+            <a:schemeClr val="accent1"/>
+          </a:fillRef>
+          <a:effectRef idx="0">
+            <a:schemeClr val="accent1"/>
+          </a:effectRef>
+          <a:fontRef idx="minor">
+            <a:schemeClr val="lt1"/>
+          </a:fontRef>
+        </p:style>
+        <p:txBody>
+          <a:bodyPr rtlCol="0" anchor="ctr"/>
+          <a:lstStyle/>
+          <a:p>
+            <a:pPr algn="ctr"/>
+            <a:endParaRPr lang="zh-TW" altLang="en-US"/>
+          </a:p>
+        </p:txBody>
+      </p:sp>
+      <p:sp>
+        <p:nvSpPr>
+          <p:cNvPr id="7" name="文字方塊 6">
+            <a:extLst>
+              <a:ext uri="{FF2B5EF4-FFF2-40B4-BE49-F238E27FC236}">
+                <a16:creationId xmlns:a16="http://schemas.microsoft.com/office/drawing/2014/main" id="{6A3F85DE-37C5-409E-9913-CF5C71DE5529}"/>
+              </a:ext>
+            </a:extLst>
+          </p:cNvPr>
+          <p:cNvSpPr txBox="1"/>
+          <p:nvPr/>
+        </p:nvSpPr>
+        <p:spPr>
+          <a:xfrm>
+            <a:off x="1828800" y="0"/>
+            <a:ext cx="10422727" cy="461665"/>
+          </a:xfrm>
+          <a:prstGeom prst="rect">
+            <a:avLst/>
+          </a:prstGeom>
+          <a:noFill/>
+        </p:spPr>
+        <p:txBody>
+          <a:bodyPr wrap="square" rtlCol="0">
+            <a:spAutoFit/>
+          </a:bodyPr>
+          <a:lstStyle/>
+          <a:p>
+            <a:r>
+              <a:rPr lang="en-US" altLang="zh-TW" sz="2400" dirty="0"/>
+              <a:t>Non-linear</a:t>
+            </a:r>
+            <a:r>
+              <a:rPr lang="zh-TW" altLang="en-US" sz="2400" dirty="0"/>
+              <a:t> </a:t>
+            </a:r>
+            <a:r>
+              <a:rPr lang="en-US" altLang="zh-TW" sz="2400" dirty="0"/>
+              <a:t>molecule</a:t>
+            </a:r>
+            <a:r>
+              <a:rPr lang="zh-TW" altLang="en-US" sz="2400" dirty="0"/>
+              <a:t> </a:t>
+            </a:r>
+            <a:r>
+              <a:rPr lang="en-US" altLang="zh-TW" sz="2400" dirty="0"/>
+              <a:t>with</a:t>
+            </a:r>
+            <a:r>
+              <a:rPr lang="zh-TW" altLang="en-US" sz="2400" dirty="0"/>
+              <a:t> </a:t>
+            </a:r>
+            <a:r>
+              <a:rPr lang="en-US" altLang="zh-TW" sz="2400" dirty="0"/>
+              <a:t>N</a:t>
+            </a:r>
+            <a:r>
+              <a:rPr lang="zh-TW" altLang="en-US" sz="2400" dirty="0"/>
+              <a:t> </a:t>
+            </a:r>
+            <a:r>
+              <a:rPr lang="en-US" altLang="zh-TW" sz="2400" dirty="0"/>
+              <a:t>atoms</a:t>
+            </a:r>
+            <a:r>
+              <a:rPr lang="zh-TW" altLang="en-US" sz="2400" dirty="0"/>
+              <a:t> </a:t>
+            </a:r>
+            <a:r>
+              <a:rPr lang="en-US" altLang="zh-TW" sz="2400" dirty="0">
+                <a:latin typeface="MS Reference Sans Serif" panose="020B0604030504040204" pitchFamily="34" charset="0"/>
+              </a:rPr>
+              <a:t>→</a:t>
+            </a:r>
+            <a:r>
+              <a:rPr lang="zh-TW" altLang="en-US" sz="2400" dirty="0">
+                <a:latin typeface="MS Reference Sans Serif" panose="020B0604030504040204" pitchFamily="34" charset="0"/>
+              </a:rPr>
+              <a:t> </a:t>
+            </a:r>
+            <a:r>
+              <a:rPr lang="en-US" altLang="zh-TW" sz="2400" dirty="0"/>
+              <a:t>3N-6</a:t>
+            </a:r>
+            <a:r>
+              <a:rPr lang="zh-TW" altLang="en-US" sz="2400" dirty="0"/>
+              <a:t> </a:t>
+            </a:r>
+            <a:r>
+              <a:rPr lang="en-US" altLang="zh-TW" sz="2400" dirty="0"/>
+              <a:t>vibrational</a:t>
+            </a:r>
+            <a:r>
+              <a:rPr lang="zh-TW" altLang="en-US" sz="2400" dirty="0"/>
+              <a:t> </a:t>
+            </a:r>
+            <a:r>
+              <a:rPr lang="en-US" altLang="zh-TW" sz="2400" dirty="0"/>
+              <a:t>modes</a:t>
+            </a:r>
+            <a:r>
+              <a:rPr lang="zh-TW" altLang="en-US" sz="2400" dirty="0"/>
+              <a:t> </a:t>
+            </a:r>
+            <a:r>
+              <a:rPr lang="en-US" altLang="zh-TW" sz="2400" dirty="0">
+                <a:latin typeface="MS Reference Sans Serif" panose="020B0604030504040204" pitchFamily="34" charset="0"/>
+              </a:rPr>
+              <a:t>→ </a:t>
+            </a:r>
+            <a:r>
+              <a:rPr lang="en-US" altLang="zh-TW" sz="2400" dirty="0"/>
+              <a:t>7N-12</a:t>
+            </a:r>
+            <a:r>
+              <a:rPr lang="zh-TW" altLang="en-US" sz="2400" dirty="0"/>
+              <a:t> </a:t>
+            </a:r>
+            <a:r>
+              <a:rPr lang="en-US" altLang="zh-TW" sz="2400" dirty="0"/>
+              <a:t>summation</a:t>
+            </a:r>
+            <a:endParaRPr lang="zh-TW" altLang="en-US" sz="2400" dirty="0"/>
+          </a:p>
+        </p:txBody>
+      </p:sp>
+      <p:grpSp>
+        <p:nvGrpSpPr>
+          <p:cNvPr id="30" name="群組 29">
+            <a:extLst>
+              <a:ext uri="{FF2B5EF4-FFF2-40B4-BE49-F238E27FC236}">
+                <a16:creationId xmlns:a16="http://schemas.microsoft.com/office/drawing/2014/main" id="{5D0EF388-5273-4F2F-9C42-31594130B2CA}"/>
+              </a:ext>
+            </a:extLst>
+          </p:cNvPr>
+          <p:cNvGrpSpPr/>
+          <p:nvPr/>
+        </p:nvGrpSpPr>
+        <p:grpSpPr>
+          <a:xfrm>
+            <a:off x="7231328" y="462425"/>
+            <a:ext cx="4854515" cy="2304852"/>
+            <a:chOff x="5715557" y="314322"/>
+            <a:chExt cx="6988701" cy="3383720"/>
+          </a:xfrm>
+        </p:grpSpPr>
+        <p:grpSp>
+          <p:nvGrpSpPr>
+            <p:cNvPr id="12" name="群組 11">
+              <a:extLst>
+                <a:ext uri="{FF2B5EF4-FFF2-40B4-BE49-F238E27FC236}">
+                  <a16:creationId xmlns:a16="http://schemas.microsoft.com/office/drawing/2014/main" id="{4FC29B72-A665-4BB3-9FE5-2F68716B17F0}"/>
+                </a:ext>
+              </a:extLst>
+            </p:cNvPr>
+            <p:cNvGrpSpPr/>
+            <p:nvPr/>
+          </p:nvGrpSpPr>
+          <p:grpSpPr>
+            <a:xfrm>
+              <a:off x="6844838" y="2105079"/>
+              <a:ext cx="1291472" cy="1287184"/>
+              <a:chOff x="4958500" y="4063110"/>
+              <a:chExt cx="1291472" cy="1287184"/>
+            </a:xfrm>
+          </p:grpSpPr>
+          <p:sp>
+            <p:nvSpPr>
+              <p:cNvPr id="13" name="手繪多邊形: 圖案 12">
+                <a:extLst>
+                  <a:ext uri="{FF2B5EF4-FFF2-40B4-BE49-F238E27FC236}">
+                    <a16:creationId xmlns:a16="http://schemas.microsoft.com/office/drawing/2014/main" id="{9A155B80-0262-4D53-B73F-8CCAB39212BA}"/>
+                  </a:ext>
+                </a:extLst>
+              </p:cNvPr>
+              <p:cNvSpPr/>
+              <p:nvPr/>
+            </p:nvSpPr>
+            <p:spPr>
+              <a:xfrm>
+                <a:off x="4958500" y="4063110"/>
+                <a:ext cx="1291472" cy="1287184"/>
+              </a:xfrm>
+              <a:custGeom>
+                <a:avLst/>
+                <a:gdLst>
+                  <a:gd name="connsiteX0" fmla="*/ 0 w 1970202"/>
+                  <a:gd name="connsiteY0" fmla="*/ 0 h 1687406"/>
+                  <a:gd name="connsiteX1" fmla="*/ 999241 w 1970202"/>
+                  <a:gd name="connsiteY1" fmla="*/ 1687398 h 1687406"/>
+                  <a:gd name="connsiteX2" fmla="*/ 1970202 w 1970202"/>
+                  <a:gd name="connsiteY2" fmla="*/ 18853 h 1687406"/>
+                </a:gdLst>
+                <a:ahLst/>
+                <a:cxnLst>
+                  <a:cxn ang="0">
+                    <a:pos x="connsiteX0" y="connsiteY0"/>
+                  </a:cxn>
+                  <a:cxn ang="0">
+                    <a:pos x="connsiteX1" y="connsiteY1"/>
+                  </a:cxn>
+                  <a:cxn ang="0">
+                    <a:pos x="connsiteX2" y="connsiteY2"/>
+                  </a:cxn>
+                </a:cxnLst>
+                <a:rect l="l" t="t" r="r" b="b"/>
+                <a:pathLst>
+                  <a:path w="1970202" h="1687406">
+                    <a:moveTo>
+                      <a:pt x="0" y="0"/>
+                    </a:moveTo>
+                    <a:cubicBezTo>
+                      <a:pt x="335437" y="842128"/>
+                      <a:pt x="670874" y="1684256"/>
+                      <a:pt x="999241" y="1687398"/>
+                    </a:cubicBezTo>
+                    <a:cubicBezTo>
+                      <a:pt x="1327608" y="1690540"/>
+                      <a:pt x="1648905" y="854696"/>
+                      <a:pt x="1970202" y="18853"/>
+                    </a:cubicBezTo>
+                  </a:path>
+                </a:pathLst>
+              </a:custGeom>
+              <a:noFill/>
+              <a:ln w="28575">
+                <a:solidFill>
+                  <a:schemeClr val="tx1"/>
+                </a:solidFill>
+              </a:ln>
+            </p:spPr>
+            <p:style>
+              <a:lnRef idx="2">
+                <a:schemeClr val="accent1">
+                  <a:shade val="50000"/>
+                </a:schemeClr>
+              </a:lnRef>
+              <a:fillRef idx="1">
+                <a:schemeClr val="accent1"/>
+              </a:fillRef>
+              <a:effectRef idx="0">
+                <a:schemeClr val="accent1"/>
+              </a:effectRef>
+              <a:fontRef idx="minor">
+                <a:schemeClr val="lt1"/>
+              </a:fontRef>
+            </p:style>
+            <p:txBody>
+              <a:bodyPr rtlCol="0" anchor="ctr"/>
+              <a:lstStyle/>
+              <a:p>
+                <a:pPr algn="ctr"/>
+                <a:endParaRPr lang="zh-TW" altLang="en-US" dirty="0"/>
+              </a:p>
+            </p:txBody>
+          </p:sp>
+          <p:cxnSp>
+            <p:nvCxnSpPr>
+              <p:cNvPr id="14" name="直線接點 13">
+                <a:extLst>
+                  <a:ext uri="{FF2B5EF4-FFF2-40B4-BE49-F238E27FC236}">
+                    <a16:creationId xmlns:a16="http://schemas.microsoft.com/office/drawing/2014/main" id="{D6A21779-39D3-414F-B2EB-0A4D712F9C4B}"/>
+                  </a:ext>
+                </a:extLst>
+              </p:cNvPr>
+              <p:cNvCxnSpPr/>
+              <p:nvPr/>
+            </p:nvCxnSpPr>
+            <p:spPr>
+              <a:xfrm>
+                <a:off x="5349712" y="5084222"/>
+                <a:ext cx="509047" cy="0"/>
+              </a:xfrm>
+              <a:prstGeom prst="line">
+                <a:avLst/>
+              </a:prstGeom>
+              <a:ln w="19050">
+                <a:solidFill>
+                  <a:schemeClr val="tx1"/>
+                </a:solidFill>
+              </a:ln>
+            </p:spPr>
+            <p:style>
+              <a:lnRef idx="1">
+                <a:schemeClr val="accent1"/>
+              </a:lnRef>
+              <a:fillRef idx="0">
+                <a:schemeClr val="accent1"/>
+              </a:fillRef>
+              <a:effectRef idx="0">
+                <a:schemeClr val="accent1"/>
+              </a:effectRef>
+              <a:fontRef idx="minor">
+                <a:schemeClr val="tx1"/>
+              </a:fontRef>
+            </p:style>
+          </p:cxnSp>
+          <p:cxnSp>
+            <p:nvCxnSpPr>
+              <p:cNvPr id="15" name="直線接點 14">
+                <a:extLst>
+                  <a:ext uri="{FF2B5EF4-FFF2-40B4-BE49-F238E27FC236}">
+                    <a16:creationId xmlns:a16="http://schemas.microsoft.com/office/drawing/2014/main" id="{34030FF6-5239-46B0-8C76-3CEDFC6F0204}"/>
+                  </a:ext>
+                </a:extLst>
+              </p:cNvPr>
+              <p:cNvCxnSpPr>
+                <a:cxnSpLocks/>
+              </p:cNvCxnSpPr>
+              <p:nvPr/>
+            </p:nvCxnSpPr>
+            <p:spPr>
+              <a:xfrm>
+                <a:off x="5232597" y="4823872"/>
+                <a:ext cx="754183" cy="0"/>
+              </a:xfrm>
+              <a:prstGeom prst="line">
+                <a:avLst/>
+              </a:prstGeom>
+              <a:ln w="19050">
+                <a:solidFill>
+                  <a:schemeClr val="tx1"/>
+                </a:solidFill>
+              </a:ln>
+            </p:spPr>
+            <p:style>
+              <a:lnRef idx="1">
+                <a:schemeClr val="accent1"/>
+              </a:lnRef>
+              <a:fillRef idx="0">
+                <a:schemeClr val="accent1"/>
+              </a:fillRef>
+              <a:effectRef idx="0">
+                <a:schemeClr val="accent1"/>
+              </a:effectRef>
+              <a:fontRef idx="minor">
+                <a:schemeClr val="tx1"/>
+              </a:fontRef>
+            </p:style>
+          </p:cxnSp>
+          <p:cxnSp>
+            <p:nvCxnSpPr>
+              <p:cNvPr id="16" name="直線接點 15">
+                <a:extLst>
+                  <a:ext uri="{FF2B5EF4-FFF2-40B4-BE49-F238E27FC236}">
+                    <a16:creationId xmlns:a16="http://schemas.microsoft.com/office/drawing/2014/main" id="{11A2719C-FBFE-4CE7-B208-0D45A0210AA1}"/>
+                  </a:ext>
+                </a:extLst>
+              </p:cNvPr>
+              <p:cNvCxnSpPr>
+                <a:cxnSpLocks/>
+              </p:cNvCxnSpPr>
+              <p:nvPr/>
+            </p:nvCxnSpPr>
+            <p:spPr>
+              <a:xfrm>
+                <a:off x="5143665" y="4582572"/>
+                <a:ext cx="939800" cy="0"/>
+              </a:xfrm>
+              <a:prstGeom prst="line">
+                <a:avLst/>
+              </a:prstGeom>
+              <a:ln w="19050">
+                <a:solidFill>
+                  <a:schemeClr val="tx1"/>
+                </a:solidFill>
+              </a:ln>
+            </p:spPr>
+            <p:style>
+              <a:lnRef idx="1">
+                <a:schemeClr val="accent1"/>
+              </a:lnRef>
+              <a:fillRef idx="0">
+                <a:schemeClr val="accent1"/>
+              </a:fillRef>
+              <a:effectRef idx="0">
+                <a:schemeClr val="accent1"/>
+              </a:effectRef>
+              <a:fontRef idx="minor">
+                <a:schemeClr val="tx1"/>
+              </a:fontRef>
+            </p:style>
+          </p:cxnSp>
+          <p:cxnSp>
+            <p:nvCxnSpPr>
+              <p:cNvPr id="17" name="直線接點 16">
+                <a:extLst>
+                  <a:ext uri="{FF2B5EF4-FFF2-40B4-BE49-F238E27FC236}">
+                    <a16:creationId xmlns:a16="http://schemas.microsoft.com/office/drawing/2014/main" id="{458FB9E2-4B97-4837-AFB9-64AFDEB73073}"/>
+                  </a:ext>
+                </a:extLst>
+              </p:cNvPr>
+              <p:cNvCxnSpPr>
+                <a:cxnSpLocks/>
+              </p:cNvCxnSpPr>
+              <p:nvPr/>
+            </p:nvCxnSpPr>
+            <p:spPr>
+              <a:xfrm>
+                <a:off x="5047226" y="4328572"/>
+                <a:ext cx="1105924" cy="0"/>
+              </a:xfrm>
+              <a:prstGeom prst="line">
+                <a:avLst/>
+              </a:prstGeom>
+              <a:ln w="19050">
+                <a:solidFill>
+                  <a:schemeClr val="tx1"/>
+                </a:solidFill>
+              </a:ln>
+            </p:spPr>
+            <p:style>
+              <a:lnRef idx="1">
+                <a:schemeClr val="accent1"/>
+              </a:lnRef>
+              <a:fillRef idx="0">
+                <a:schemeClr val="accent1"/>
+              </a:fillRef>
+              <a:effectRef idx="0">
+                <a:schemeClr val="accent1"/>
+              </a:effectRef>
+              <a:fontRef idx="minor">
+                <a:schemeClr val="tx1"/>
+              </a:fontRef>
+            </p:style>
+          </p:cxnSp>
+        </p:grpSp>
+        <p:grpSp>
+          <p:nvGrpSpPr>
+            <p:cNvPr id="18" name="群組 17">
+              <a:extLst>
+                <a:ext uri="{FF2B5EF4-FFF2-40B4-BE49-F238E27FC236}">
+                  <a16:creationId xmlns:a16="http://schemas.microsoft.com/office/drawing/2014/main" id="{E98F862B-A3AC-4228-BE8A-44001F00DF36}"/>
+                </a:ext>
+              </a:extLst>
+            </p:cNvPr>
+            <p:cNvGrpSpPr/>
+            <p:nvPr/>
+          </p:nvGrpSpPr>
+          <p:grpSpPr>
+            <a:xfrm>
+              <a:off x="7708437" y="1353938"/>
+              <a:ext cx="1291472" cy="1287184"/>
+              <a:chOff x="4958500" y="4063110"/>
+              <a:chExt cx="1291472" cy="1287184"/>
+            </a:xfrm>
+          </p:grpSpPr>
+          <p:sp>
+            <p:nvSpPr>
+              <p:cNvPr id="19" name="手繪多邊形: 圖案 18">
+                <a:extLst>
+                  <a:ext uri="{FF2B5EF4-FFF2-40B4-BE49-F238E27FC236}">
+                    <a16:creationId xmlns:a16="http://schemas.microsoft.com/office/drawing/2014/main" id="{9F41A846-CB5D-42F6-ADBC-9F9FF98E434B}"/>
+                  </a:ext>
+                </a:extLst>
+              </p:cNvPr>
+              <p:cNvSpPr/>
+              <p:nvPr/>
+            </p:nvSpPr>
+            <p:spPr>
+              <a:xfrm>
+                <a:off x="4958500" y="4063110"/>
+                <a:ext cx="1291472" cy="1287184"/>
+              </a:xfrm>
+              <a:custGeom>
+                <a:avLst/>
+                <a:gdLst>
+                  <a:gd name="connsiteX0" fmla="*/ 0 w 1970202"/>
+                  <a:gd name="connsiteY0" fmla="*/ 0 h 1687406"/>
+                  <a:gd name="connsiteX1" fmla="*/ 999241 w 1970202"/>
+                  <a:gd name="connsiteY1" fmla="*/ 1687398 h 1687406"/>
+                  <a:gd name="connsiteX2" fmla="*/ 1970202 w 1970202"/>
+                  <a:gd name="connsiteY2" fmla="*/ 18853 h 1687406"/>
+                </a:gdLst>
+                <a:ahLst/>
+                <a:cxnLst>
+                  <a:cxn ang="0">
+                    <a:pos x="connsiteX0" y="connsiteY0"/>
+                  </a:cxn>
+                  <a:cxn ang="0">
+                    <a:pos x="connsiteX1" y="connsiteY1"/>
+                  </a:cxn>
+                  <a:cxn ang="0">
+                    <a:pos x="connsiteX2" y="connsiteY2"/>
+                  </a:cxn>
+                </a:cxnLst>
+                <a:rect l="l" t="t" r="r" b="b"/>
+                <a:pathLst>
+                  <a:path w="1970202" h="1687406">
+                    <a:moveTo>
+                      <a:pt x="0" y="0"/>
+                    </a:moveTo>
+                    <a:cubicBezTo>
+                      <a:pt x="335437" y="842128"/>
+                      <a:pt x="670874" y="1684256"/>
+                      <a:pt x="999241" y="1687398"/>
+                    </a:cubicBezTo>
+                    <a:cubicBezTo>
+                      <a:pt x="1327608" y="1690540"/>
+                      <a:pt x="1648905" y="854696"/>
+                      <a:pt x="1970202" y="18853"/>
+                    </a:cubicBezTo>
+                  </a:path>
+                </a:pathLst>
+              </a:custGeom>
+              <a:noFill/>
+              <a:ln w="28575">
+                <a:solidFill>
+                  <a:schemeClr val="tx1"/>
+                </a:solidFill>
+              </a:ln>
+            </p:spPr>
+            <p:style>
+              <a:lnRef idx="2">
+                <a:schemeClr val="accent1">
+                  <a:shade val="50000"/>
+                </a:schemeClr>
+              </a:lnRef>
+              <a:fillRef idx="1">
+                <a:schemeClr val="accent1"/>
+              </a:fillRef>
+              <a:effectRef idx="0">
+                <a:schemeClr val="accent1"/>
+              </a:effectRef>
+              <a:fontRef idx="minor">
+                <a:schemeClr val="lt1"/>
+              </a:fontRef>
+            </p:style>
+            <p:txBody>
+              <a:bodyPr rtlCol="0" anchor="ctr"/>
+              <a:lstStyle/>
+              <a:p>
+                <a:pPr algn="ctr"/>
+                <a:endParaRPr lang="zh-TW" altLang="en-US" dirty="0"/>
+              </a:p>
+            </p:txBody>
+          </p:sp>
+          <p:cxnSp>
+            <p:nvCxnSpPr>
+              <p:cNvPr id="20" name="直線接點 19">
+                <a:extLst>
+                  <a:ext uri="{FF2B5EF4-FFF2-40B4-BE49-F238E27FC236}">
+                    <a16:creationId xmlns:a16="http://schemas.microsoft.com/office/drawing/2014/main" id="{BCFC535E-BD0C-4057-A686-72EC2DDC8268}"/>
+                  </a:ext>
+                </a:extLst>
+              </p:cNvPr>
+              <p:cNvCxnSpPr>
+                <a:cxnSpLocks/>
+              </p:cNvCxnSpPr>
+              <p:nvPr/>
+            </p:nvCxnSpPr>
+            <p:spPr>
+              <a:xfrm>
+                <a:off x="5349712" y="5084222"/>
+                <a:ext cx="511655" cy="0"/>
+              </a:xfrm>
+              <a:prstGeom prst="line">
+                <a:avLst/>
+              </a:prstGeom>
+              <a:ln w="19050">
+                <a:solidFill>
+                  <a:schemeClr val="tx1"/>
+                </a:solidFill>
+              </a:ln>
+            </p:spPr>
+            <p:style>
+              <a:lnRef idx="1">
+                <a:schemeClr val="accent1"/>
+              </a:lnRef>
+              <a:fillRef idx="0">
+                <a:schemeClr val="accent1"/>
+              </a:fillRef>
+              <a:effectRef idx="0">
+                <a:schemeClr val="accent1"/>
+              </a:effectRef>
+              <a:fontRef idx="minor">
+                <a:schemeClr val="tx1"/>
+              </a:fontRef>
+            </p:style>
+          </p:cxnSp>
+          <p:cxnSp>
+            <p:nvCxnSpPr>
+              <p:cNvPr id="21" name="直線接點 20">
+                <a:extLst>
+                  <a:ext uri="{FF2B5EF4-FFF2-40B4-BE49-F238E27FC236}">
+                    <a16:creationId xmlns:a16="http://schemas.microsoft.com/office/drawing/2014/main" id="{60448DE7-EDF7-40E9-B007-55F834907039}"/>
+                  </a:ext>
+                </a:extLst>
+              </p:cNvPr>
+              <p:cNvCxnSpPr>
+                <a:cxnSpLocks/>
+              </p:cNvCxnSpPr>
+              <p:nvPr/>
+            </p:nvCxnSpPr>
+            <p:spPr>
+              <a:xfrm>
+                <a:off x="5232597" y="4823872"/>
+                <a:ext cx="754183" cy="0"/>
+              </a:xfrm>
+              <a:prstGeom prst="line">
+                <a:avLst/>
+              </a:prstGeom>
+              <a:ln w="19050">
+                <a:solidFill>
+                  <a:schemeClr val="tx1"/>
+                </a:solidFill>
+              </a:ln>
+            </p:spPr>
+            <p:style>
+              <a:lnRef idx="1">
+                <a:schemeClr val="accent1"/>
+              </a:lnRef>
+              <a:fillRef idx="0">
+                <a:schemeClr val="accent1"/>
+              </a:fillRef>
+              <a:effectRef idx="0">
+                <a:schemeClr val="accent1"/>
+              </a:effectRef>
+              <a:fontRef idx="minor">
+                <a:schemeClr val="tx1"/>
+              </a:fontRef>
+            </p:style>
+          </p:cxnSp>
+          <p:cxnSp>
+            <p:nvCxnSpPr>
+              <p:cNvPr id="22" name="直線接點 21">
+                <a:extLst>
+                  <a:ext uri="{FF2B5EF4-FFF2-40B4-BE49-F238E27FC236}">
+                    <a16:creationId xmlns:a16="http://schemas.microsoft.com/office/drawing/2014/main" id="{7A798E0E-2479-4220-BA45-D3CDE09E63D4}"/>
+                  </a:ext>
+                </a:extLst>
+              </p:cNvPr>
+              <p:cNvCxnSpPr>
+                <a:cxnSpLocks/>
+              </p:cNvCxnSpPr>
+              <p:nvPr/>
+            </p:nvCxnSpPr>
+            <p:spPr>
+              <a:xfrm>
+                <a:off x="5129000" y="4582572"/>
+                <a:ext cx="946150" cy="0"/>
+              </a:xfrm>
+              <a:prstGeom prst="line">
+                <a:avLst/>
+              </a:prstGeom>
+              <a:ln w="19050">
+                <a:solidFill>
+                  <a:schemeClr val="tx1"/>
+                </a:solidFill>
+              </a:ln>
+            </p:spPr>
+            <p:style>
+              <a:lnRef idx="1">
+                <a:schemeClr val="accent1"/>
+              </a:lnRef>
+              <a:fillRef idx="0">
+                <a:schemeClr val="accent1"/>
+              </a:fillRef>
+              <a:effectRef idx="0">
+                <a:schemeClr val="accent1"/>
+              </a:effectRef>
+              <a:fontRef idx="minor">
+                <a:schemeClr val="tx1"/>
+              </a:fontRef>
+            </p:style>
+          </p:cxnSp>
+          <p:cxnSp>
+            <p:nvCxnSpPr>
+              <p:cNvPr id="23" name="直線接點 22">
+                <a:extLst>
+                  <a:ext uri="{FF2B5EF4-FFF2-40B4-BE49-F238E27FC236}">
+                    <a16:creationId xmlns:a16="http://schemas.microsoft.com/office/drawing/2014/main" id="{7E73656A-3D37-4C38-8DAD-C2DDF50315E8}"/>
+                  </a:ext>
+                </a:extLst>
+              </p:cNvPr>
+              <p:cNvCxnSpPr>
+                <a:cxnSpLocks/>
+              </p:cNvCxnSpPr>
+              <p:nvPr/>
+            </p:nvCxnSpPr>
+            <p:spPr>
+              <a:xfrm>
+                <a:off x="5055975" y="4328572"/>
+                <a:ext cx="1124504" cy="0"/>
+              </a:xfrm>
+              <a:prstGeom prst="line">
+                <a:avLst/>
+              </a:prstGeom>
+              <a:ln w="19050">
+                <a:solidFill>
+                  <a:schemeClr val="tx1"/>
+                </a:solidFill>
+              </a:ln>
+            </p:spPr>
+            <p:style>
+              <a:lnRef idx="1">
+                <a:schemeClr val="accent1"/>
+              </a:lnRef>
+              <a:fillRef idx="0">
+                <a:schemeClr val="accent1"/>
+              </a:fillRef>
+              <a:effectRef idx="0">
+                <a:schemeClr val="accent1"/>
+              </a:effectRef>
+              <a:fontRef idx="minor">
+                <a:schemeClr val="tx1"/>
+              </a:fontRef>
+            </p:style>
+          </p:cxnSp>
+        </p:grpSp>
+        <p:cxnSp>
+          <p:nvCxnSpPr>
+            <p:cNvPr id="24" name="直線單箭頭接點 23">
+              <a:extLst>
+                <a:ext uri="{FF2B5EF4-FFF2-40B4-BE49-F238E27FC236}">
+                  <a16:creationId xmlns:a16="http://schemas.microsoft.com/office/drawing/2014/main" id="{4722178B-A00D-49F7-A55F-7AFCE7A79F9B}"/>
+                </a:ext>
+              </a:extLst>
+            </p:cNvPr>
+            <p:cNvCxnSpPr>
+              <a:cxnSpLocks/>
+            </p:cNvCxnSpPr>
+            <p:nvPr/>
+          </p:nvCxnSpPr>
+          <p:spPr>
+            <a:xfrm>
+              <a:off x="6335790" y="3437762"/>
+              <a:ext cx="3601040" cy="0"/>
+            </a:xfrm>
+            <a:prstGeom prst="straightConnector1">
+              <a:avLst/>
+            </a:prstGeom>
+            <a:ln w="19050">
+              <a:solidFill>
+                <a:schemeClr val="tx1"/>
+              </a:solidFill>
+              <a:tailEnd type="triangle"/>
+            </a:ln>
+          </p:spPr>
+          <p:style>
+            <a:lnRef idx="1">
+              <a:schemeClr val="accent1"/>
+            </a:lnRef>
+            <a:fillRef idx="0">
+              <a:schemeClr val="accent1"/>
+            </a:fillRef>
+            <a:effectRef idx="0">
+              <a:schemeClr val="accent1"/>
+            </a:effectRef>
+            <a:fontRef idx="minor">
+              <a:schemeClr val="tx1"/>
+            </a:fontRef>
+          </p:style>
+        </p:cxnSp>
+        <p:cxnSp>
+          <p:nvCxnSpPr>
+            <p:cNvPr id="25" name="直線單箭頭接點 24">
+              <a:extLst>
+                <a:ext uri="{FF2B5EF4-FFF2-40B4-BE49-F238E27FC236}">
+                  <a16:creationId xmlns:a16="http://schemas.microsoft.com/office/drawing/2014/main" id="{236F9403-F00D-4128-90FF-456A29076552}"/>
+                </a:ext>
+              </a:extLst>
+            </p:cNvPr>
+            <p:cNvCxnSpPr>
+              <a:cxnSpLocks/>
+            </p:cNvCxnSpPr>
+            <p:nvPr/>
+          </p:nvCxnSpPr>
+          <p:spPr>
+            <a:xfrm flipH="1" flipV="1">
+              <a:off x="6322866" y="787853"/>
+              <a:ext cx="21995" cy="2649909"/>
+            </a:xfrm>
+            <a:prstGeom prst="straightConnector1">
+              <a:avLst/>
+            </a:prstGeom>
+            <a:ln w="19050">
+              <a:solidFill>
+                <a:schemeClr val="tx1"/>
+              </a:solidFill>
+              <a:tailEnd type="triangle"/>
+            </a:ln>
+          </p:spPr>
+          <p:style>
+            <a:lnRef idx="1">
+              <a:schemeClr val="accent1"/>
+            </a:lnRef>
+            <a:fillRef idx="0">
+              <a:schemeClr val="accent1"/>
+            </a:fillRef>
+            <a:effectRef idx="0">
+              <a:schemeClr val="accent1"/>
+            </a:effectRef>
+            <a:fontRef idx="minor">
+              <a:schemeClr val="tx1"/>
+            </a:fontRef>
+          </p:style>
+        </p:cxnSp>
+        <mc:AlternateContent xmlns:mc="http://schemas.openxmlformats.org/markup-compatibility/2006" xmlns:a14="http://schemas.microsoft.com/office/drawing/2010/main">
+          <mc:Choice Requires="a14">
+            <p:sp>
+              <p:nvSpPr>
+                <p:cNvPr id="26" name="文字方塊 25">
+                  <a:extLst>
+                    <a:ext uri="{FF2B5EF4-FFF2-40B4-BE49-F238E27FC236}">
+                      <a16:creationId xmlns:a16="http://schemas.microsoft.com/office/drawing/2014/main" id="{8B876B64-060F-404A-9583-4F38DF4F17E7}"/>
+                    </a:ext>
+                  </a:extLst>
+                </p:cNvPr>
+                <p:cNvSpPr txBox="1"/>
+                <p:nvPr/>
+              </p:nvSpPr>
+              <p:spPr>
+                <a:xfrm>
+                  <a:off x="9020598" y="1941103"/>
+                  <a:ext cx="456086" cy="369332"/>
+                </a:xfrm>
+                <a:prstGeom prst="rect">
+                  <a:avLst/>
+                </a:prstGeom>
+                <a:noFill/>
+              </p:spPr>
+              <p:txBody>
+                <a:bodyPr wrap="none" rtlCol="0">
+                  <a:spAutoFit/>
+                </a:bodyPr>
+                <a:lstStyle/>
+                <a:p>
+                  <a:pPr/>
+                  <a14:m>
+                    <m:oMathPara xmlns:m="http://schemas.openxmlformats.org/officeDocument/2006/math">
+                      <m:oMathParaPr>
+                        <m:jc m:val="centerGroup"/>
+                      </m:oMathParaPr>
+                      <m:oMath xmlns:m="http://schemas.openxmlformats.org/officeDocument/2006/math">
+                        <m:sSub>
+                          <m:sSubPr>
+                            <m:ctrlPr>
+                              <a:rPr lang="en-US" altLang="zh-TW" b="0" i="1" smtClean="0">
+                                <a:latin typeface="Cambria Math" panose="02040503050406030204" pitchFamily="18" charset="0"/>
+                              </a:rPr>
+                            </m:ctrlPr>
+                          </m:sSubPr>
+                          <m:e>
+                            <m:r>
+                              <a:rPr lang="en-US" altLang="zh-TW" b="0" i="1" smtClean="0">
+                                <a:latin typeface="Cambria Math" panose="02040503050406030204" pitchFamily="18" charset="0"/>
+                              </a:rPr>
+                              <m:t>𝑆</m:t>
+                            </m:r>
+                          </m:e>
+                          <m:sub>
+                            <m:r>
+                              <a:rPr lang="en-US" altLang="zh-TW" b="0" i="1" smtClean="0">
+                                <a:latin typeface="Cambria Math" panose="02040503050406030204" pitchFamily="18" charset="0"/>
+                              </a:rPr>
+                              <m:t>1</m:t>
+                            </m:r>
+                          </m:sub>
+                        </m:sSub>
+                      </m:oMath>
+                    </m:oMathPara>
+                  </a14:m>
+                  <a:endParaRPr lang="zh-TW" altLang="en-US" dirty="0"/>
+                </a:p>
+              </p:txBody>
+            </p:sp>
+          </mc:Choice>
+          <mc:Fallback xmlns="">
+            <p:sp>
+              <p:nvSpPr>
+                <p:cNvPr id="26" name="文字方塊 25">
+                  <a:extLst>
+                    <a:ext uri="{FF2B5EF4-FFF2-40B4-BE49-F238E27FC236}">
+                      <a16:creationId xmlns:a16="http://schemas.microsoft.com/office/drawing/2014/main" id="{8B876B64-060F-404A-9583-4F38DF4F17E7}"/>
+                    </a:ext>
+                  </a:extLst>
+                </p:cNvPr>
+                <p:cNvSpPr txBox="1">
+                  <a:spLocks noRot="1" noChangeAspect="1" noMove="1" noResize="1" noEditPoints="1" noAdjustHandles="1" noChangeArrowheads="1" noChangeShapeType="1" noTextEdit="1"/>
+                </p:cNvSpPr>
+                <p:nvPr/>
+              </p:nvSpPr>
+              <p:spPr>
+                <a:xfrm>
+                  <a:off x="9020598" y="1941103"/>
+                  <a:ext cx="456086" cy="369332"/>
+                </a:xfrm>
+                <a:prstGeom prst="rect">
+                  <a:avLst/>
+                </a:prstGeom>
+                <a:blipFill>
+                  <a:blip r:embed="rId6"/>
+                  <a:stretch>
+                    <a:fillRect r="-9615" b="-48780"/>
+                  </a:stretch>
+                </a:blipFill>
+              </p:spPr>
+              <p:txBody>
+                <a:bodyPr/>
+                <a:lstStyle/>
+                <a:p>
+                  <a:r>
+                    <a:rPr lang="zh-TW" altLang="en-US">
+                      <a:noFill/>
+                    </a:rPr>
+                    <a:t> </a:t>
+                  </a:r>
+                </a:p>
+              </p:txBody>
+            </p:sp>
+          </mc:Fallback>
+        </mc:AlternateContent>
+        <mc:AlternateContent xmlns:mc="http://schemas.openxmlformats.org/markup-compatibility/2006" xmlns:a14="http://schemas.microsoft.com/office/drawing/2010/main">
+          <mc:Choice Requires="a14">
+            <p:sp>
+              <p:nvSpPr>
+                <p:cNvPr id="27" name="文字方塊 26">
+                  <a:extLst>
+                    <a:ext uri="{FF2B5EF4-FFF2-40B4-BE49-F238E27FC236}">
+                      <a16:creationId xmlns:a16="http://schemas.microsoft.com/office/drawing/2014/main" id="{2CE66CEC-2D84-4688-9A00-56C0C2E73D2B}"/>
+                    </a:ext>
+                  </a:extLst>
+                </p:cNvPr>
+                <p:cNvSpPr txBox="1"/>
+                <p:nvPr/>
+              </p:nvSpPr>
+              <p:spPr>
+                <a:xfrm>
+                  <a:off x="6549311" y="2560166"/>
+                  <a:ext cx="461408" cy="369332"/>
+                </a:xfrm>
+                <a:prstGeom prst="rect">
+                  <a:avLst/>
+                </a:prstGeom>
+                <a:noFill/>
+              </p:spPr>
+              <p:txBody>
+                <a:bodyPr wrap="none" rtlCol="0">
+                  <a:spAutoFit/>
+                </a:bodyPr>
+                <a:lstStyle/>
+                <a:p>
+                  <a:pPr/>
+                  <a14:m>
+                    <m:oMathPara xmlns:m="http://schemas.openxmlformats.org/officeDocument/2006/math">
+                      <m:oMathParaPr>
+                        <m:jc m:val="centerGroup"/>
+                      </m:oMathParaPr>
+                      <m:oMath xmlns:m="http://schemas.openxmlformats.org/officeDocument/2006/math">
+                        <m:sSub>
+                          <m:sSubPr>
+                            <m:ctrlPr>
+                              <a:rPr lang="en-US" altLang="zh-TW" b="0" i="1" smtClean="0">
+                                <a:latin typeface="Cambria Math" panose="02040503050406030204" pitchFamily="18" charset="0"/>
+                              </a:rPr>
+                            </m:ctrlPr>
+                          </m:sSubPr>
+                          <m:e>
+                            <m:r>
+                              <a:rPr lang="en-US" altLang="zh-TW" b="0" i="1" smtClean="0">
+                                <a:latin typeface="Cambria Math" panose="02040503050406030204" pitchFamily="18" charset="0"/>
+                              </a:rPr>
+                              <m:t>𝑆</m:t>
+                            </m:r>
+                          </m:e>
+                          <m:sub>
+                            <m:r>
+                              <a:rPr lang="en-US" altLang="zh-TW" b="0" i="1" smtClean="0">
+                                <a:latin typeface="Cambria Math" panose="02040503050406030204" pitchFamily="18" charset="0"/>
+                              </a:rPr>
+                              <m:t>0</m:t>
+                            </m:r>
+                          </m:sub>
+                        </m:sSub>
+                      </m:oMath>
+                    </m:oMathPara>
+                  </a14:m>
+                  <a:endParaRPr lang="zh-TW" altLang="en-US" dirty="0"/>
+                </a:p>
+              </p:txBody>
+            </p:sp>
+          </mc:Choice>
+          <mc:Fallback xmlns="">
+            <p:sp>
+              <p:nvSpPr>
+                <p:cNvPr id="27" name="文字方塊 26">
+                  <a:extLst>
+                    <a:ext uri="{FF2B5EF4-FFF2-40B4-BE49-F238E27FC236}">
+                      <a16:creationId xmlns:a16="http://schemas.microsoft.com/office/drawing/2014/main" id="{2CE66CEC-2D84-4688-9A00-56C0C2E73D2B}"/>
+                    </a:ext>
+                  </a:extLst>
+                </p:cNvPr>
+                <p:cNvSpPr txBox="1">
+                  <a:spLocks noRot="1" noChangeAspect="1" noMove="1" noResize="1" noEditPoints="1" noAdjustHandles="1" noChangeArrowheads="1" noChangeShapeType="1" noTextEdit="1"/>
+                </p:cNvSpPr>
+                <p:nvPr/>
+              </p:nvSpPr>
+              <p:spPr>
+                <a:xfrm>
+                  <a:off x="6549311" y="2560166"/>
+                  <a:ext cx="461408" cy="369332"/>
+                </a:xfrm>
+                <a:prstGeom prst="rect">
+                  <a:avLst/>
+                </a:prstGeom>
+                <a:blipFill>
+                  <a:blip r:embed="rId7"/>
+                  <a:stretch>
+                    <a:fillRect r="-11321" b="-48780"/>
+                  </a:stretch>
+                </a:blipFill>
+              </p:spPr>
+              <p:txBody>
+                <a:bodyPr/>
+                <a:lstStyle/>
+                <a:p>
+                  <a:r>
+                    <a:rPr lang="zh-TW" altLang="en-US">
+                      <a:noFill/>
+                    </a:rPr>
+                    <a:t> </a:t>
+                  </a:r>
+                </a:p>
+              </p:txBody>
+            </p:sp>
+          </mc:Fallback>
+        </mc:AlternateContent>
+        <p:sp>
+          <p:nvSpPr>
+            <p:cNvPr id="28" name="文字方塊 27">
+              <a:extLst>
+                <a:ext uri="{FF2B5EF4-FFF2-40B4-BE49-F238E27FC236}">
+                  <a16:creationId xmlns:a16="http://schemas.microsoft.com/office/drawing/2014/main" id="{AAE40428-330B-4596-8AD4-6EB0EAE831AD}"/>
+                </a:ext>
+              </a:extLst>
+            </p:cNvPr>
+            <p:cNvSpPr txBox="1"/>
+            <p:nvPr/>
+          </p:nvSpPr>
+          <p:spPr>
+            <a:xfrm>
+              <a:off x="5715557" y="314322"/>
+              <a:ext cx="847348" cy="369332"/>
+            </a:xfrm>
+            <a:prstGeom prst="rect">
+              <a:avLst/>
+            </a:prstGeom>
+            <a:noFill/>
+          </p:spPr>
+          <p:txBody>
+            <a:bodyPr wrap="none" rtlCol="0">
+              <a:spAutoFit/>
+            </a:bodyPr>
+            <a:lstStyle/>
+            <a:p>
+              <a:r>
+                <a:rPr lang="en-US" altLang="zh-TW" dirty="0"/>
+                <a:t>Energy</a:t>
+              </a:r>
+              <a:endParaRPr lang="zh-TW" altLang="en-US" dirty="0"/>
+            </a:p>
+          </p:txBody>
+        </p:sp>
+        <p:sp>
+          <p:nvSpPr>
+            <p:cNvPr id="29" name="文字方塊 28">
+              <a:extLst>
+                <a:ext uri="{FF2B5EF4-FFF2-40B4-BE49-F238E27FC236}">
+                  <a16:creationId xmlns:a16="http://schemas.microsoft.com/office/drawing/2014/main" id="{1FCA2B06-3DFF-401A-A482-2513340FB0B1}"/>
+                </a:ext>
+              </a:extLst>
+            </p:cNvPr>
+            <p:cNvSpPr txBox="1"/>
+            <p:nvPr/>
+          </p:nvSpPr>
+          <p:spPr>
+            <a:xfrm>
+              <a:off x="9936829" y="3155831"/>
+              <a:ext cx="2767429" cy="542211"/>
+            </a:xfrm>
+            <a:prstGeom prst="rect">
+              <a:avLst/>
+            </a:prstGeom>
+            <a:noFill/>
+          </p:spPr>
+          <p:txBody>
+            <a:bodyPr wrap="none" rtlCol="0">
+              <a:spAutoFit/>
+            </a:bodyPr>
+            <a:lstStyle/>
+            <a:p>
+              <a:r>
+                <a:rPr lang="en-US" altLang="zh-TW" dirty="0"/>
+                <a:t>Internal</a:t>
+              </a:r>
+              <a:r>
+                <a:rPr lang="zh-TW" altLang="en-US" dirty="0"/>
+                <a:t> </a:t>
+              </a:r>
+              <a:r>
+                <a:rPr lang="en-US" altLang="zh-TW" dirty="0"/>
+                <a:t>coordinate</a:t>
+              </a:r>
+              <a:endParaRPr lang="zh-TW" altLang="en-US" dirty="0"/>
+            </a:p>
+          </p:txBody>
+        </p:sp>
+      </p:grpSp>
     </p:spTree>
     <p:extLst>
       <p:ext uri="{BB962C8B-B14F-4D97-AF65-F5344CB8AC3E}">
-        <p14:creationId xmlns:p14="http://schemas.microsoft.com/office/powerpoint/2010/main" val="348128361"/>
+        <p14:creationId xmlns:p14="http://schemas.microsoft.com/office/powerpoint/2010/main" val="4216734192"/>
       </p:ext>
     </p:extLst>
   </p:cSld>
@@ -6249,7 +7312,7 @@
           <p:cNvPr id="2" name="標題 1">
             <a:extLst>
               <a:ext uri="{FF2B5EF4-FFF2-40B4-BE49-F238E27FC236}">
-                <a16:creationId xmlns:a16="http://schemas.microsoft.com/office/drawing/2014/main" id="{8E75F9D6-92FB-4B07-817C-F519297D5FC4}"/>
+                <a16:creationId xmlns:a16="http://schemas.microsoft.com/office/drawing/2014/main" id="{AEF512F8-0FD7-4745-B69B-BDFDD5C73BCC}"/>
               </a:ext>
             </a:extLst>
           </p:cNvPr>
@@ -6267,7 +7330,7 @@
           <a:p>
             <a:r>
               <a:rPr lang="en-US" altLang="zh-TW" dirty="0"/>
-              <a:t>Internal</a:t>
+              <a:t>Code</a:t>
             </a:r>
             <a:r>
               <a:rPr lang="zh-TW" altLang="en-US" dirty="0"/>
@@ -6275,16 +7338,9 @@
             </a:r>
             <a:r>
               <a:rPr lang="en-US" altLang="zh-TW" dirty="0"/>
-              <a:t>conversion</a:t>
-            </a:r>
-            <a:r>
-              <a:rPr lang="zh-TW" altLang="en-US" dirty="0"/>
-              <a:t> </a:t>
-            </a:r>
-            <a:r>
-              <a:rPr lang="en-US" altLang="zh-TW" dirty="0"/>
-              <a:t>rate</a:t>
-            </a:r>
+              <a:t>Implementation</a:t>
+            </a:r>
+            <a:endParaRPr lang="zh-TW" altLang="en-US" dirty="0"/>
           </a:p>
         </p:txBody>
       </p:sp>
@@ -6293,7 +7349,7 @@
           <p:cNvPr id="3" name="內容版面配置區 2">
             <a:extLst>
               <a:ext uri="{FF2B5EF4-FFF2-40B4-BE49-F238E27FC236}">
-                <a16:creationId xmlns:a16="http://schemas.microsoft.com/office/drawing/2014/main" id="{EBF37545-85BF-4D8C-801F-77D09E847EC6}"/>
+                <a16:creationId xmlns:a16="http://schemas.microsoft.com/office/drawing/2014/main" id="{5146D434-A9B2-4980-9227-328B2566B6C7}"/>
               </a:ext>
             </a:extLst>
           </p:cNvPr>
@@ -6311,7 +7367,7 @@
           <a:p>
             <a:r>
               <a:rPr lang="en-US" altLang="zh-TW" dirty="0"/>
-              <a:t>From</a:t>
+              <a:t>To</a:t>
             </a:r>
             <a:r>
               <a:rPr lang="zh-TW" altLang="en-US" dirty="0"/>
@@ -6319,7 +7375,19 @@
             </a:r>
             <a:r>
               <a:rPr lang="en-US" altLang="zh-TW" dirty="0"/>
-              <a:t>Fermi’s</a:t>
+              <a:t>implement</a:t>
+            </a:r>
+          </a:p>
+          <a:p>
+            <a:endParaRPr lang="en-US" altLang="zh-TW" dirty="0"/>
+          </a:p>
+          <a:p>
+            <a:endParaRPr lang="en-US" altLang="zh-TW" dirty="0"/>
+          </a:p>
+          <a:p>
+            <a:r>
+              <a:rPr lang="en-US" altLang="zh-TW" dirty="0"/>
+              <a:t>Construct</a:t>
             </a:r>
             <a:r>
               <a:rPr lang="zh-TW" altLang="en-US" dirty="0"/>
@@ -6327,7 +7395,7 @@
             </a:r>
             <a:r>
               <a:rPr lang="en-US" altLang="zh-TW" dirty="0"/>
-              <a:t>golden</a:t>
+              <a:t>the</a:t>
             </a:r>
             <a:r>
               <a:rPr lang="zh-TW" altLang="en-US" dirty="0"/>
@@ -6335,8 +7403,97 @@
             </a:r>
             <a:r>
               <a:rPr lang="en-US" altLang="zh-TW" dirty="0"/>
-              <a:t>rule</a:t>
-            </a:r>
+              <a:t>function</a:t>
+            </a:r>
+          </a:p>
+          <a:p>
+            <a:pPr lvl="1"/>
+            <a:r>
+              <a:rPr lang="en-US" altLang="zh-TW" dirty="0"/>
+              <a:t>Input</a:t>
+            </a:r>
+            <a:r>
+              <a:rPr lang="zh-TW" altLang="en-US" dirty="0"/>
+              <a:t> </a:t>
+            </a:r>
+            <a:r>
+              <a:rPr lang="en-US" altLang="zh-TW" dirty="0"/>
+              <a:t>is</a:t>
+            </a:r>
+            <a:r>
+              <a:rPr lang="zh-TW" altLang="en-US" dirty="0"/>
+              <a:t> </a:t>
+            </a:r>
+            <a:r>
+              <a:rPr lang="en-US" altLang="zh-TW" dirty="0"/>
+              <a:t>an</a:t>
+            </a:r>
+            <a:r>
+              <a:rPr lang="zh-TW" altLang="en-US" dirty="0"/>
+              <a:t> </a:t>
+            </a:r>
+            <a:r>
+              <a:rPr lang="en-US" altLang="zh-TW" dirty="0"/>
+              <a:t>array</a:t>
+            </a:r>
+            <a:r>
+              <a:rPr lang="zh-TW" altLang="en-US" dirty="0"/>
+              <a:t> </a:t>
+            </a:r>
+            <a:endParaRPr lang="en-US" altLang="zh-TW" dirty="0"/>
+          </a:p>
+          <a:p>
+            <a:endParaRPr lang="en-US" altLang="zh-TW" dirty="0"/>
+          </a:p>
+          <a:p>
+            <a:r>
+              <a:rPr lang="en-US" altLang="zh-TW" dirty="0"/>
+              <a:t>Generate</a:t>
+            </a:r>
+            <a:r>
+              <a:rPr lang="zh-TW" altLang="en-US" dirty="0"/>
+              <a:t> </a:t>
+            </a:r>
+            <a:r>
+              <a:rPr lang="en-US" altLang="zh-TW" dirty="0"/>
+              <a:t>			</a:t>
+            </a:r>
+            <a:r>
+              <a:rPr lang="zh-TW" altLang="en-US" dirty="0"/>
+              <a:t>     </a:t>
+            </a:r>
+            <a:r>
+              <a:rPr lang="en-US" altLang="zh-TW" dirty="0"/>
+              <a:t>for</a:t>
+            </a:r>
+            <a:r>
+              <a:rPr lang="zh-TW" altLang="en-US" dirty="0"/>
+              <a:t> </a:t>
+            </a:r>
+            <a:r>
+              <a:rPr lang="en-US" altLang="zh-TW" dirty="0"/>
+              <a:t>each</a:t>
+            </a:r>
+            <a:r>
+              <a:rPr lang="zh-TW" altLang="en-US" dirty="0"/>
+              <a:t> </a:t>
+            </a:r>
+            <a:endParaRPr lang="en-US" altLang="zh-TW" dirty="0"/>
+          </a:p>
+          <a:p>
+            <a:pPr lvl="1"/>
+            <a:r>
+              <a:rPr lang="en-US" altLang="zh-TW" dirty="0"/>
+              <a:t>E.g.</a:t>
+            </a:r>
+            <a:r>
+              <a:rPr lang="zh-TW" altLang="en-US" dirty="0"/>
+              <a:t> </a:t>
+            </a:r>
+            <a:endParaRPr lang="en-US" altLang="zh-TW" dirty="0"/>
+          </a:p>
+          <a:p>
+            <a:endParaRPr lang="en-US" altLang="zh-TW" dirty="0"/>
           </a:p>
           <a:p>
             <a:endParaRPr lang="zh-TW" altLang="en-US" dirty="0"/>
@@ -6348,7 +7505,7 @@
           <p:cNvPr id="4" name="投影片編號版面配置區 3">
             <a:extLst>
               <a:ext uri="{FF2B5EF4-FFF2-40B4-BE49-F238E27FC236}">
-                <a16:creationId xmlns:a16="http://schemas.microsoft.com/office/drawing/2014/main" id="{A2511B5B-B4B9-467D-81A2-E2973668E703}"/>
+                <a16:creationId xmlns:a16="http://schemas.microsoft.com/office/drawing/2014/main" id="{4B314E47-772C-452B-B8FA-BCDF5A8E50BA}"/>
               </a:ext>
             </a:extLst>
           </p:cNvPr>
@@ -6367,626 +7524,6 @@
             <a:fld id="{D28B8240-4ECF-41F4-B10D-8095B57EA97A}" type="slidenum">
               <a:rPr lang="zh-TW" altLang="en-US" smtClean="0"/>
               <a:t>16</a:t>
-            </a:fld>
-            <a:endParaRPr lang="zh-TW" altLang="en-US"/>
-          </a:p>
-        </p:txBody>
-      </p:sp>
-      <p:pic>
-        <p:nvPicPr>
-          <p:cNvPr id="5" name="圖片 4" descr="\documentclass{article}&#10;&#10;\pagestyle{empty}&#10;&#10;\usepackage{amsmath}&#10;\usepackage{graphics}&#10;\usepackage{color}&#10;\usepackage{mathtools}&#10;\usepackage{braket}&#10;\usepackage{physics}&#10;&#10;\begin{document}&#10;\begin{align*}&#10;&amp;k^{\mathrm{IC, nr}}_{f \leftarrow i} = \sum_{b = 1}^{3N-6} \frac{\abs{R_b(f \leftarrow i)}^2}{\hbar^2} \frac{\omega_b}{\hbar}&#10;\sum_{\tilde{v}_b} \sum_{{v}_b} {P}_{i {v}_b} \abs{&#10;\sqrt{v_b+1} \bra{ \chi_{f\tilde{v}_b} } \ket{ \chi_{i({v}_b+1)} } - \sqrt{v_b} \bra{ \chi_{f\tilde{v}_b} } \ket{ \chi_{i({v}_b-1)} } &#10;}^2&#10;\\&#10;&amp;\quad \quad \times  \prod_{b' \neq b} &#10;\sum_{\tilde{v}_{b'}} \sum_{{v}_{b'}} {P}_{i {v}_{b'}} \abs{ \bra{ \chi_{f\tilde{v}_{b'}} } \ket{ \chi_{i{v}_{b'}} } }^2&#10;\frac{\Gamma}{&#10;\left[ \omega_{fi} + \sum_{c = 1}^{3N-6} &#10;\left( &#10;(\tilde{v}_c + \frac{1}{2}) \tilde{\omega_c} &#10;- &#10;({v}_c + \frac{1}{2}) {\omega_c}&#10;\right)\right]^2 + \Gamma^2}&#10;\end{align*}&#10;\end{document}" title="IguanaTex Bitmap Display">
-            <a:extLst>
-              <a:ext uri="{FF2B5EF4-FFF2-40B4-BE49-F238E27FC236}">
-                <a16:creationId xmlns:a16="http://schemas.microsoft.com/office/drawing/2014/main" id="{92F8BB81-FD71-4B9D-83A4-41B56DF1E663}"/>
-              </a:ext>
-            </a:extLst>
-          </p:cNvPr>
-          <p:cNvPicPr>
-            <a:picLocks noChangeAspect="1"/>
-          </p:cNvPicPr>
-          <p:nvPr>
-            <p:custDataLst>
-              <p:tags r:id="rId1"/>
-            </p:custDataLst>
-          </p:nvPr>
-        </p:nvPicPr>
-        <p:blipFill>
-          <a:blip r:embed="rId4" cstate="print">
-            <a:extLst>
-              <a:ext uri="{28A0092B-C50C-407E-A947-70E740481C1C}">
-                <a14:useLocalDpi xmlns:a14="http://schemas.microsoft.com/office/drawing/2010/main" val="0"/>
-              </a:ext>
-            </a:extLst>
-          </a:blip>
-          <a:stretch>
-            <a:fillRect/>
-          </a:stretch>
-        </p:blipFill>
-        <p:spPr>
-          <a:xfrm>
-            <a:off x="1023498" y="2824353"/>
-            <a:ext cx="11039852" cy="1920494"/>
-          </a:xfrm>
-          <a:prstGeom prst="rect">
-            <a:avLst/>
-          </a:prstGeom>
-        </p:spPr>
-      </p:pic>
-      <p:sp>
-        <p:nvSpPr>
-          <p:cNvPr id="6" name="矩形: 圓角 5">
-            <a:extLst>
-              <a:ext uri="{FF2B5EF4-FFF2-40B4-BE49-F238E27FC236}">
-                <a16:creationId xmlns:a16="http://schemas.microsoft.com/office/drawing/2014/main" id="{4793EFBF-4F1F-4629-8807-8A92C77252AA}"/>
-              </a:ext>
-            </a:extLst>
-          </p:cNvPr>
-          <p:cNvSpPr/>
-          <p:nvPr/>
-        </p:nvSpPr>
-        <p:spPr>
-          <a:xfrm>
-            <a:off x="1828800" y="3794887"/>
-            <a:ext cx="1524000" cy="863600"/>
-          </a:xfrm>
-          <a:prstGeom prst="roundRect">
-            <a:avLst/>
-          </a:prstGeom>
-          <a:noFill/>
-          <a:ln>
-            <a:solidFill>
-              <a:srgbClr val="FF0000"/>
-            </a:solidFill>
-          </a:ln>
-        </p:spPr>
-        <p:style>
-          <a:lnRef idx="2">
-            <a:schemeClr val="accent1">
-              <a:shade val="50000"/>
-            </a:schemeClr>
-          </a:lnRef>
-          <a:fillRef idx="1">
-            <a:schemeClr val="accent1"/>
-          </a:fillRef>
-          <a:effectRef idx="0">
-            <a:schemeClr val="accent1"/>
-          </a:effectRef>
-          <a:fontRef idx="minor">
-            <a:schemeClr val="lt1"/>
-          </a:fontRef>
-        </p:style>
-        <p:txBody>
-          <a:bodyPr rtlCol="0" anchor="ctr"/>
-          <a:lstStyle/>
-          <a:p>
-            <a:pPr algn="ctr"/>
-            <a:endParaRPr lang="zh-TW" altLang="en-US"/>
-          </a:p>
-        </p:txBody>
-      </p:sp>
-      <p:pic>
-        <p:nvPicPr>
-          <p:cNvPr id="8" name="圖片 7" descr="\documentclass{article}&#10;&#10;\usepackage{amssymb,amsmath,amsthm,amsfonts,physics}&#10;&#10;&#10;\pagestyle{empty}&#10;&#10;\begin{document}&#10;&#10;\begin{align*}&#10;\sum_{x_1}\sum_{x_2}\cdots\sum_{x_n} f(x_1, x_2, \cdots, x_n)&#10;\end{align*}&#10;&#10;\end{document}" title="IguanaTex Bitmap Display">
-            <a:extLst>
-              <a:ext uri="{FF2B5EF4-FFF2-40B4-BE49-F238E27FC236}">
-                <a16:creationId xmlns:a16="http://schemas.microsoft.com/office/drawing/2014/main" id="{B1D9BAE0-E727-490A-8C64-3DD3CCB39A5A}"/>
-              </a:ext>
-            </a:extLst>
-          </p:cNvPr>
-          <p:cNvPicPr>
-            <a:picLocks noChangeAspect="1"/>
-          </p:cNvPicPr>
-          <p:nvPr>
-            <p:custDataLst>
-              <p:tags r:id="rId2"/>
-            </p:custDataLst>
-          </p:nvPr>
-        </p:nvPicPr>
-        <p:blipFill>
-          <a:blip r:embed="rId5">
-            <a:extLst>
-              <a:ext uri="{28A0092B-C50C-407E-A947-70E740481C1C}">
-                <a14:useLocalDpi xmlns:a14="http://schemas.microsoft.com/office/drawing/2010/main" val="0"/>
-              </a:ext>
-            </a:extLst>
-          </a:blip>
-          <a:stretch>
-            <a:fillRect/>
-          </a:stretch>
-        </p:blipFill>
-        <p:spPr>
-          <a:xfrm>
-            <a:off x="3830320" y="5429901"/>
-            <a:ext cx="4531360" cy="747062"/>
-          </a:xfrm>
-          <a:prstGeom prst="rect">
-            <a:avLst/>
-          </a:prstGeom>
-        </p:spPr>
-      </p:pic>
-      <p:sp>
-        <p:nvSpPr>
-          <p:cNvPr id="9" name="矩形: 圓角 8">
-            <a:extLst>
-              <a:ext uri="{FF2B5EF4-FFF2-40B4-BE49-F238E27FC236}">
-                <a16:creationId xmlns:a16="http://schemas.microsoft.com/office/drawing/2014/main" id="{3E95EA31-C14D-4E97-B7B1-A818F2BD20D2}"/>
-              </a:ext>
-            </a:extLst>
-          </p:cNvPr>
-          <p:cNvSpPr/>
-          <p:nvPr/>
-        </p:nvSpPr>
-        <p:spPr>
-          <a:xfrm>
-            <a:off x="4724400" y="2888297"/>
-            <a:ext cx="904240" cy="863600"/>
-          </a:xfrm>
-          <a:prstGeom prst="roundRect">
-            <a:avLst/>
-          </a:prstGeom>
-          <a:noFill/>
-          <a:ln>
-            <a:solidFill>
-              <a:srgbClr val="FF0000"/>
-            </a:solidFill>
-          </a:ln>
-        </p:spPr>
-        <p:style>
-          <a:lnRef idx="2">
-            <a:schemeClr val="accent1">
-              <a:shade val="50000"/>
-            </a:schemeClr>
-          </a:lnRef>
-          <a:fillRef idx="1">
-            <a:schemeClr val="accent1"/>
-          </a:fillRef>
-          <a:effectRef idx="0">
-            <a:schemeClr val="accent1"/>
-          </a:effectRef>
-          <a:fontRef idx="minor">
-            <a:schemeClr val="lt1"/>
-          </a:fontRef>
-        </p:style>
-        <p:txBody>
-          <a:bodyPr rtlCol="0" anchor="ctr"/>
-          <a:lstStyle/>
-          <a:p>
-            <a:pPr algn="ctr"/>
-            <a:endParaRPr lang="zh-TW" altLang="en-US"/>
-          </a:p>
-        </p:txBody>
-      </p:sp>
-      <p:sp>
-        <p:nvSpPr>
-          <p:cNvPr id="10" name="箭號: 向右 9">
-            <a:extLst>
-              <a:ext uri="{FF2B5EF4-FFF2-40B4-BE49-F238E27FC236}">
-                <a16:creationId xmlns:a16="http://schemas.microsoft.com/office/drawing/2014/main" id="{1BCBBAD0-8291-4F1F-A348-880080DCFBEC}"/>
-              </a:ext>
-            </a:extLst>
-          </p:cNvPr>
-          <p:cNvSpPr/>
-          <p:nvPr/>
-        </p:nvSpPr>
-        <p:spPr>
-          <a:xfrm>
-            <a:off x="1582420" y="5537200"/>
-            <a:ext cx="1503680" cy="386080"/>
-          </a:xfrm>
-          <a:prstGeom prst="rightArrow">
-            <a:avLst/>
-          </a:prstGeom>
-        </p:spPr>
-        <p:style>
-          <a:lnRef idx="2">
-            <a:schemeClr val="accent1">
-              <a:shade val="50000"/>
-            </a:schemeClr>
-          </a:lnRef>
-          <a:fillRef idx="1">
-            <a:schemeClr val="accent1"/>
-          </a:fillRef>
-          <a:effectRef idx="0">
-            <a:schemeClr val="accent1"/>
-          </a:effectRef>
-          <a:fontRef idx="minor">
-            <a:schemeClr val="lt1"/>
-          </a:fontRef>
-        </p:style>
-        <p:txBody>
-          <a:bodyPr rtlCol="0" anchor="ctr"/>
-          <a:lstStyle/>
-          <a:p>
-            <a:pPr algn="ctr"/>
-            <a:endParaRPr lang="zh-TW" altLang="en-US"/>
-          </a:p>
-        </p:txBody>
-      </p:sp>
-      <p:sp>
-        <p:nvSpPr>
-          <p:cNvPr id="7" name="文字方塊 6">
-            <a:extLst>
-              <a:ext uri="{FF2B5EF4-FFF2-40B4-BE49-F238E27FC236}">
-                <a16:creationId xmlns:a16="http://schemas.microsoft.com/office/drawing/2014/main" id="{6A3F85DE-37C5-409E-9913-CF5C71DE5529}"/>
-              </a:ext>
-            </a:extLst>
-          </p:cNvPr>
-          <p:cNvSpPr txBox="1"/>
-          <p:nvPr/>
-        </p:nvSpPr>
-        <p:spPr>
-          <a:xfrm>
-            <a:off x="1828800" y="0"/>
-            <a:ext cx="10422727" cy="461665"/>
-          </a:xfrm>
-          <a:prstGeom prst="rect">
-            <a:avLst/>
-          </a:prstGeom>
-          <a:noFill/>
-        </p:spPr>
-        <p:txBody>
-          <a:bodyPr wrap="square" rtlCol="0">
-            <a:spAutoFit/>
-          </a:bodyPr>
-          <a:lstStyle/>
-          <a:p>
-            <a:r>
-              <a:rPr lang="en-US" altLang="zh-TW" sz="2400" dirty="0"/>
-              <a:t>Non-linear</a:t>
-            </a:r>
-            <a:r>
-              <a:rPr lang="zh-TW" altLang="en-US" sz="2400" dirty="0"/>
-              <a:t> </a:t>
-            </a:r>
-            <a:r>
-              <a:rPr lang="en-US" altLang="zh-TW" sz="2400" dirty="0"/>
-              <a:t>molecule</a:t>
-            </a:r>
-            <a:r>
-              <a:rPr lang="zh-TW" altLang="en-US" sz="2400" dirty="0"/>
-              <a:t> </a:t>
-            </a:r>
-            <a:r>
-              <a:rPr lang="en-US" altLang="zh-TW" sz="2400" dirty="0"/>
-              <a:t>with</a:t>
-            </a:r>
-            <a:r>
-              <a:rPr lang="zh-TW" altLang="en-US" sz="2400" dirty="0"/>
-              <a:t> </a:t>
-            </a:r>
-            <a:r>
-              <a:rPr lang="en-US" altLang="zh-TW" sz="2400" dirty="0"/>
-              <a:t>N</a:t>
-            </a:r>
-            <a:r>
-              <a:rPr lang="zh-TW" altLang="en-US" sz="2400" dirty="0"/>
-              <a:t> </a:t>
-            </a:r>
-            <a:r>
-              <a:rPr lang="en-US" altLang="zh-TW" sz="2400" dirty="0"/>
-              <a:t>atoms</a:t>
-            </a:r>
-            <a:r>
-              <a:rPr lang="zh-TW" altLang="en-US" sz="2400" dirty="0"/>
-              <a:t> </a:t>
-            </a:r>
-            <a:r>
-              <a:rPr lang="en-US" altLang="zh-TW" sz="2400" dirty="0">
-                <a:latin typeface="MS Reference Sans Serif" panose="020B0604030504040204" pitchFamily="34" charset="0"/>
-              </a:rPr>
-              <a:t>→</a:t>
-            </a:r>
-            <a:r>
-              <a:rPr lang="zh-TW" altLang="en-US" sz="2400" dirty="0">
-                <a:latin typeface="MS Reference Sans Serif" panose="020B0604030504040204" pitchFamily="34" charset="0"/>
-              </a:rPr>
-              <a:t> </a:t>
-            </a:r>
-            <a:r>
-              <a:rPr lang="en-US" altLang="zh-TW" sz="2400" dirty="0"/>
-              <a:t>3N-6</a:t>
-            </a:r>
-            <a:r>
-              <a:rPr lang="zh-TW" altLang="en-US" sz="2400" dirty="0"/>
-              <a:t> </a:t>
-            </a:r>
-            <a:r>
-              <a:rPr lang="en-US" altLang="zh-TW" sz="2400" dirty="0"/>
-              <a:t>vibrational</a:t>
-            </a:r>
-            <a:r>
-              <a:rPr lang="zh-TW" altLang="en-US" sz="2400" dirty="0"/>
-              <a:t> </a:t>
-            </a:r>
-            <a:r>
-              <a:rPr lang="en-US" altLang="zh-TW" sz="2400" dirty="0"/>
-              <a:t>modes</a:t>
-            </a:r>
-            <a:r>
-              <a:rPr lang="zh-TW" altLang="en-US" sz="2400" dirty="0"/>
-              <a:t> </a:t>
-            </a:r>
-            <a:r>
-              <a:rPr lang="en-US" altLang="zh-TW" sz="2400" dirty="0">
-                <a:latin typeface="MS Reference Sans Serif" panose="020B0604030504040204" pitchFamily="34" charset="0"/>
-              </a:rPr>
-              <a:t>→ </a:t>
-            </a:r>
-            <a:r>
-              <a:rPr lang="en-US" altLang="zh-TW" sz="2400" dirty="0"/>
-              <a:t>7N-12</a:t>
-            </a:r>
-            <a:r>
-              <a:rPr lang="zh-TW" altLang="en-US" sz="2400" dirty="0"/>
-              <a:t> </a:t>
-            </a:r>
-            <a:r>
-              <a:rPr lang="en-US" altLang="zh-TW" sz="2400" dirty="0"/>
-              <a:t>summation</a:t>
-            </a:r>
-            <a:endParaRPr lang="zh-TW" altLang="en-US" sz="2400" dirty="0"/>
-          </a:p>
-        </p:txBody>
-      </p:sp>
-    </p:spTree>
-    <p:extLst>
-      <p:ext uri="{BB962C8B-B14F-4D97-AF65-F5344CB8AC3E}">
-        <p14:creationId xmlns:p14="http://schemas.microsoft.com/office/powerpoint/2010/main" val="4216734192"/>
-      </p:ext>
-    </p:extLst>
-  </p:cSld>
-  <p:clrMapOvr>
-    <a:masterClrMapping/>
-  </p:clrMapOvr>
-  <mc:AlternateContent xmlns:mc="http://schemas.openxmlformats.org/markup-compatibility/2006" xmlns:p14="http://schemas.microsoft.com/office/powerpoint/2010/main">
-    <mc:Choice Requires="p14">
-      <p:transition spd="slow" p14:dur="2000">
-        <p:cut/>
-      </p:transition>
-    </mc:Choice>
-    <mc:Fallback xmlns="">
-      <p:transition spd="slow">
-        <p:cut/>
-      </p:transition>
-    </mc:Fallback>
-  </mc:AlternateContent>
-</p:sld>
-</file>
-
-<file path=ppt/slides/slide17.xml><?xml version="1.0" encoding="utf-8"?>
-<p:sld xmlns:a="http://schemas.openxmlformats.org/drawingml/2006/main" xmlns:r="http://schemas.openxmlformats.org/officeDocument/2006/relationships" xmlns:p="http://schemas.openxmlformats.org/presentationml/2006/main">
-  <p:cSld>
-    <p:spTree>
-      <p:nvGrpSpPr>
-        <p:cNvPr id="1" name=""/>
-        <p:cNvGrpSpPr/>
-        <p:nvPr/>
-      </p:nvGrpSpPr>
-      <p:grpSpPr>
-        <a:xfrm>
-          <a:off x="0" y="0"/>
-          <a:ext cx="0" cy="0"/>
-          <a:chOff x="0" y="0"/>
-          <a:chExt cx="0" cy="0"/>
-        </a:xfrm>
-      </p:grpSpPr>
-      <p:sp>
-        <p:nvSpPr>
-          <p:cNvPr id="2" name="標題 1">
-            <a:extLst>
-              <a:ext uri="{FF2B5EF4-FFF2-40B4-BE49-F238E27FC236}">
-                <a16:creationId xmlns:a16="http://schemas.microsoft.com/office/drawing/2014/main" id="{AEF512F8-0FD7-4745-B69B-BDFDD5C73BCC}"/>
-              </a:ext>
-            </a:extLst>
-          </p:cNvPr>
-          <p:cNvSpPr>
-            <a:spLocks noGrp="1"/>
-          </p:cNvSpPr>
-          <p:nvPr>
-            <p:ph type="title"/>
-          </p:nvPr>
-        </p:nvSpPr>
-        <p:spPr/>
-        <p:txBody>
-          <a:bodyPr/>
-          <a:lstStyle/>
-          <a:p>
-            <a:r>
-              <a:rPr lang="en-US" altLang="zh-TW" dirty="0"/>
-              <a:t>Code</a:t>
-            </a:r>
-            <a:r>
-              <a:rPr lang="zh-TW" altLang="en-US" dirty="0"/>
-              <a:t> </a:t>
-            </a:r>
-            <a:r>
-              <a:rPr lang="en-US" altLang="zh-TW" dirty="0"/>
-              <a:t>Implementation</a:t>
-            </a:r>
-            <a:endParaRPr lang="zh-TW" altLang="en-US" dirty="0"/>
-          </a:p>
-        </p:txBody>
-      </p:sp>
-      <p:sp>
-        <p:nvSpPr>
-          <p:cNvPr id="3" name="內容版面配置區 2">
-            <a:extLst>
-              <a:ext uri="{FF2B5EF4-FFF2-40B4-BE49-F238E27FC236}">
-                <a16:creationId xmlns:a16="http://schemas.microsoft.com/office/drawing/2014/main" id="{5146D434-A9B2-4980-9227-328B2566B6C7}"/>
-              </a:ext>
-            </a:extLst>
-          </p:cNvPr>
-          <p:cNvSpPr>
-            <a:spLocks noGrp="1"/>
-          </p:cNvSpPr>
-          <p:nvPr>
-            <p:ph idx="1"/>
-          </p:nvPr>
-        </p:nvSpPr>
-        <p:spPr/>
-        <p:txBody>
-          <a:bodyPr/>
-          <a:lstStyle/>
-          <a:p>
-            <a:r>
-              <a:rPr lang="en-US" altLang="zh-TW" dirty="0"/>
-              <a:t>To</a:t>
-            </a:r>
-            <a:r>
-              <a:rPr lang="zh-TW" altLang="en-US" dirty="0"/>
-              <a:t> </a:t>
-            </a:r>
-            <a:r>
-              <a:rPr lang="en-US" altLang="zh-TW" dirty="0"/>
-              <a:t>implement</a:t>
-            </a:r>
-          </a:p>
-          <a:p>
-            <a:endParaRPr lang="en-US" altLang="zh-TW" dirty="0"/>
-          </a:p>
-          <a:p>
-            <a:endParaRPr lang="en-US" altLang="zh-TW" dirty="0"/>
-          </a:p>
-          <a:p>
-            <a:r>
-              <a:rPr lang="en-US" altLang="zh-TW" dirty="0"/>
-              <a:t>Construct</a:t>
-            </a:r>
-            <a:r>
-              <a:rPr lang="zh-TW" altLang="en-US" dirty="0"/>
-              <a:t> </a:t>
-            </a:r>
-            <a:r>
-              <a:rPr lang="en-US" altLang="zh-TW" dirty="0"/>
-              <a:t>the</a:t>
-            </a:r>
-            <a:r>
-              <a:rPr lang="zh-TW" altLang="en-US" dirty="0"/>
-              <a:t> </a:t>
-            </a:r>
-            <a:r>
-              <a:rPr lang="en-US" altLang="zh-TW" dirty="0"/>
-              <a:t>function</a:t>
-            </a:r>
-          </a:p>
-          <a:p>
-            <a:pPr lvl="1"/>
-            <a:r>
-              <a:rPr lang="en-US" altLang="zh-TW" dirty="0"/>
-              <a:t>Input</a:t>
-            </a:r>
-            <a:r>
-              <a:rPr lang="zh-TW" altLang="en-US" dirty="0"/>
-              <a:t> </a:t>
-            </a:r>
-            <a:r>
-              <a:rPr lang="en-US" altLang="zh-TW" dirty="0"/>
-              <a:t>is</a:t>
-            </a:r>
-            <a:r>
-              <a:rPr lang="zh-TW" altLang="en-US" dirty="0"/>
-              <a:t> </a:t>
-            </a:r>
-            <a:r>
-              <a:rPr lang="en-US" altLang="zh-TW" dirty="0"/>
-              <a:t>an</a:t>
-            </a:r>
-            <a:r>
-              <a:rPr lang="zh-TW" altLang="en-US" dirty="0"/>
-              <a:t> </a:t>
-            </a:r>
-            <a:r>
-              <a:rPr lang="en-US" altLang="zh-TW" dirty="0"/>
-              <a:t>array</a:t>
-            </a:r>
-            <a:r>
-              <a:rPr lang="zh-TW" altLang="en-US" dirty="0"/>
-              <a:t> </a:t>
-            </a:r>
-            <a:endParaRPr lang="en-US" altLang="zh-TW" dirty="0"/>
-          </a:p>
-          <a:p>
-            <a:endParaRPr lang="en-US" altLang="zh-TW" dirty="0"/>
-          </a:p>
-          <a:p>
-            <a:r>
-              <a:rPr lang="en-US" altLang="zh-TW" dirty="0"/>
-              <a:t>Generate</a:t>
-            </a:r>
-            <a:r>
-              <a:rPr lang="zh-TW" altLang="en-US" dirty="0"/>
-              <a:t> </a:t>
-            </a:r>
-            <a:r>
-              <a:rPr lang="en-US" altLang="zh-TW" dirty="0"/>
-              <a:t>			</a:t>
-            </a:r>
-            <a:r>
-              <a:rPr lang="zh-TW" altLang="en-US" dirty="0"/>
-              <a:t>     </a:t>
-            </a:r>
-            <a:r>
-              <a:rPr lang="en-US" altLang="zh-TW" dirty="0"/>
-              <a:t>for</a:t>
-            </a:r>
-            <a:r>
-              <a:rPr lang="zh-TW" altLang="en-US" dirty="0"/>
-              <a:t> </a:t>
-            </a:r>
-            <a:r>
-              <a:rPr lang="en-US" altLang="zh-TW" dirty="0"/>
-              <a:t>each</a:t>
-            </a:r>
-            <a:r>
-              <a:rPr lang="zh-TW" altLang="en-US" dirty="0"/>
-              <a:t> </a:t>
-            </a:r>
-            <a:endParaRPr lang="en-US" altLang="zh-TW" dirty="0"/>
-          </a:p>
-          <a:p>
-            <a:pPr lvl="1"/>
-            <a:r>
-              <a:rPr lang="en-US" altLang="zh-TW" dirty="0"/>
-              <a:t>E.g.</a:t>
-            </a:r>
-            <a:r>
-              <a:rPr lang="zh-TW" altLang="en-US" dirty="0"/>
-              <a:t> </a:t>
-            </a:r>
-            <a:endParaRPr lang="en-US" altLang="zh-TW" dirty="0"/>
-          </a:p>
-          <a:p>
-            <a:endParaRPr lang="en-US" altLang="zh-TW" dirty="0"/>
-          </a:p>
-          <a:p>
-            <a:endParaRPr lang="zh-TW" altLang="en-US" dirty="0"/>
-          </a:p>
-        </p:txBody>
-      </p:sp>
-      <p:sp>
-        <p:nvSpPr>
-          <p:cNvPr id="4" name="投影片編號版面配置區 3">
-            <a:extLst>
-              <a:ext uri="{FF2B5EF4-FFF2-40B4-BE49-F238E27FC236}">
-                <a16:creationId xmlns:a16="http://schemas.microsoft.com/office/drawing/2014/main" id="{4B314E47-772C-452B-B8FA-BCDF5A8E50BA}"/>
-              </a:ext>
-            </a:extLst>
-          </p:cNvPr>
-          <p:cNvSpPr>
-            <a:spLocks noGrp="1"/>
-          </p:cNvSpPr>
-          <p:nvPr>
-            <p:ph type="sldNum" sz="quarter" idx="12"/>
-          </p:nvPr>
-        </p:nvSpPr>
-        <p:spPr/>
-        <p:txBody>
-          <a:bodyPr/>
-          <a:lstStyle/>
-          <a:p>
-            <a:fld id="{D28B8240-4ECF-41F4-B10D-8095B57EA97A}" type="slidenum">
-              <a:rPr lang="zh-TW" altLang="en-US" smtClean="0"/>
-              <a:t>17</a:t>
             </a:fld>
             <a:endParaRPr lang="zh-TW" altLang="en-US"/>
           </a:p>
@@ -7585,6 +8122,840 @@
 </p:sld>
 </file>
 
+<file path=ppt/slides/slide17.xml><?xml version="1.0" encoding="utf-8"?>
+<p:sld xmlns:a="http://schemas.openxmlformats.org/drawingml/2006/main" xmlns:r="http://schemas.openxmlformats.org/officeDocument/2006/relationships" xmlns:p="http://schemas.openxmlformats.org/presentationml/2006/main">
+  <p:cSld>
+    <p:spTree>
+      <p:nvGrpSpPr>
+        <p:cNvPr id="1" name=""/>
+        <p:cNvGrpSpPr/>
+        <p:nvPr/>
+      </p:nvGrpSpPr>
+      <p:grpSpPr>
+        <a:xfrm>
+          <a:off x="0" y="0"/>
+          <a:ext cx="0" cy="0"/>
+          <a:chOff x="0" y="0"/>
+          <a:chExt cx="0" cy="0"/>
+        </a:xfrm>
+      </p:grpSpPr>
+      <p:sp>
+        <p:nvSpPr>
+          <p:cNvPr id="2" name="標題 1">
+            <a:extLst>
+              <a:ext uri="{FF2B5EF4-FFF2-40B4-BE49-F238E27FC236}">
+                <a16:creationId xmlns:a16="http://schemas.microsoft.com/office/drawing/2014/main" id="{5F0ED300-12DB-475F-9456-FEF53B5CB91F}"/>
+              </a:ext>
+            </a:extLst>
+          </p:cNvPr>
+          <p:cNvSpPr>
+            <a:spLocks noGrp="1"/>
+          </p:cNvSpPr>
+          <p:nvPr>
+            <p:ph type="title"/>
+          </p:nvPr>
+        </p:nvSpPr>
+        <p:spPr>
+          <a:xfrm>
+            <a:off x="838200" y="365125"/>
+            <a:ext cx="10515600" cy="1325563"/>
+          </a:xfrm>
+        </p:spPr>
+        <p:txBody>
+          <a:bodyPr/>
+          <a:lstStyle/>
+          <a:p>
+            <a:r>
+              <a:rPr lang="en-US" altLang="zh-TW" dirty="0"/>
+              <a:t>Algorithm</a:t>
+            </a:r>
+            <a:endParaRPr lang="zh-TW" altLang="en-US" dirty="0"/>
+          </a:p>
+        </p:txBody>
+      </p:sp>
+      <p:sp>
+        <p:nvSpPr>
+          <p:cNvPr id="4" name="投影片編號版面配置區 3">
+            <a:extLst>
+              <a:ext uri="{FF2B5EF4-FFF2-40B4-BE49-F238E27FC236}">
+                <a16:creationId xmlns:a16="http://schemas.microsoft.com/office/drawing/2014/main" id="{CCF9D7BA-06A9-41D5-BCEF-E0A8E5F054EE}"/>
+              </a:ext>
+            </a:extLst>
+          </p:cNvPr>
+          <p:cNvSpPr>
+            <a:spLocks noGrp="1"/>
+          </p:cNvSpPr>
+          <p:nvPr>
+            <p:ph type="sldNum" sz="quarter" idx="12"/>
+          </p:nvPr>
+        </p:nvSpPr>
+        <p:spPr/>
+        <p:txBody>
+          <a:bodyPr/>
+          <a:lstStyle/>
+          <a:p>
+            <a:fld id="{D28B8240-4ECF-41F4-B10D-8095B57EA97A}" type="slidenum">
+              <a:rPr lang="zh-TW" altLang="en-US" smtClean="0"/>
+              <a:t>17</a:t>
+            </a:fld>
+            <a:endParaRPr lang="zh-TW" altLang="en-US"/>
+          </a:p>
+        </p:txBody>
+      </p:sp>
+      <p:sp>
+        <p:nvSpPr>
+          <p:cNvPr id="8" name="矩形 7">
+            <a:extLst>
+              <a:ext uri="{FF2B5EF4-FFF2-40B4-BE49-F238E27FC236}">
+                <a16:creationId xmlns:a16="http://schemas.microsoft.com/office/drawing/2014/main" id="{5156BE2B-190D-4FEB-A310-F856F2A03DB8}"/>
+              </a:ext>
+            </a:extLst>
+          </p:cNvPr>
+          <p:cNvSpPr/>
+          <p:nvPr/>
+        </p:nvSpPr>
+        <p:spPr>
+          <a:xfrm>
+            <a:off x="838200" y="1289309"/>
+            <a:ext cx="2843471" cy="369332"/>
+          </a:xfrm>
+          <a:prstGeom prst="rect">
+            <a:avLst/>
+          </a:prstGeom>
+        </p:spPr>
+        <p:txBody>
+          <a:bodyPr wrap="none">
+            <a:spAutoFit/>
+          </a:bodyPr>
+          <a:lstStyle/>
+          <a:p>
+            <a:r>
+              <a:rPr lang="zh-TW" altLang="en-US" dirty="0"/>
+              <a:t>algorithm_generate_array.py</a:t>
+            </a:r>
+          </a:p>
+        </p:txBody>
+      </p:sp>
+      <p:sp>
+        <p:nvSpPr>
+          <p:cNvPr id="9" name="文字方塊 8">
+            <a:extLst>
+              <a:ext uri="{FF2B5EF4-FFF2-40B4-BE49-F238E27FC236}">
+                <a16:creationId xmlns:a16="http://schemas.microsoft.com/office/drawing/2014/main" id="{E4C6790E-0B68-44A4-A46E-DA0C1444BD25}"/>
+              </a:ext>
+            </a:extLst>
+          </p:cNvPr>
+          <p:cNvSpPr txBox="1"/>
+          <p:nvPr/>
+        </p:nvSpPr>
+        <p:spPr>
+          <a:xfrm>
+            <a:off x="4450080" y="-20976"/>
+            <a:ext cx="7814960" cy="369332"/>
+          </a:xfrm>
+          <a:prstGeom prst="rect">
+            <a:avLst/>
+          </a:prstGeom>
+          <a:noFill/>
+        </p:spPr>
+        <p:txBody>
+          <a:bodyPr wrap="none" rtlCol="0">
+            <a:spAutoFit/>
+          </a:bodyPr>
+          <a:lstStyle/>
+          <a:p>
+            <a:r>
+              <a:rPr lang="en-US" altLang="zh-TW" dirty="0">
+                <a:hlinkClick r:id="rId2"/>
+              </a:rPr>
+              <a:t>recursion - Function with varying number of For Loops (python) - Stack Overflow</a:t>
+            </a:r>
+            <a:endParaRPr lang="zh-TW" altLang="en-US" dirty="0"/>
+          </a:p>
+        </p:txBody>
+      </p:sp>
+      <p:pic>
+        <p:nvPicPr>
+          <p:cNvPr id="10" name="圖片 9">
+            <a:extLst>
+              <a:ext uri="{FF2B5EF4-FFF2-40B4-BE49-F238E27FC236}">
+                <a16:creationId xmlns:a16="http://schemas.microsoft.com/office/drawing/2014/main" id="{0F0E35F9-D476-4013-81D0-081E4948517C}"/>
+              </a:ext>
+            </a:extLst>
+          </p:cNvPr>
+          <p:cNvPicPr>
+            <a:picLocks noChangeAspect="1"/>
+          </p:cNvPicPr>
+          <p:nvPr/>
+        </p:nvPicPr>
+        <p:blipFill>
+          <a:blip r:embed="rId3"/>
+          <a:stretch>
+            <a:fillRect/>
+          </a:stretch>
+        </p:blipFill>
+        <p:spPr>
+          <a:xfrm>
+            <a:off x="838200" y="1707457"/>
+            <a:ext cx="7471841" cy="5069679"/>
+          </a:xfrm>
+          <a:prstGeom prst="rect">
+            <a:avLst/>
+          </a:prstGeom>
+        </p:spPr>
+      </p:pic>
+      <p:sp>
+        <p:nvSpPr>
+          <p:cNvPr id="11" name="矩形 10">
+            <a:extLst>
+              <a:ext uri="{FF2B5EF4-FFF2-40B4-BE49-F238E27FC236}">
+                <a16:creationId xmlns:a16="http://schemas.microsoft.com/office/drawing/2014/main" id="{05440C7B-B955-448E-99EC-E5761ADE0D19}"/>
+              </a:ext>
+            </a:extLst>
+          </p:cNvPr>
+          <p:cNvSpPr/>
+          <p:nvPr/>
+        </p:nvSpPr>
+        <p:spPr>
+          <a:xfrm>
+            <a:off x="9433560" y="2297171"/>
+            <a:ext cx="365760" cy="335280"/>
+          </a:xfrm>
+          <a:prstGeom prst="rect">
+            <a:avLst/>
+          </a:prstGeom>
+          <a:solidFill>
+            <a:srgbClr val="FF0000"/>
+          </a:solidFill>
+          <a:ln>
+            <a:noFill/>
+          </a:ln>
+        </p:spPr>
+        <p:style>
+          <a:lnRef idx="2">
+            <a:schemeClr val="accent1">
+              <a:shade val="50000"/>
+            </a:schemeClr>
+          </a:lnRef>
+          <a:fillRef idx="1">
+            <a:schemeClr val="accent1"/>
+          </a:fillRef>
+          <a:effectRef idx="0">
+            <a:schemeClr val="accent1"/>
+          </a:effectRef>
+          <a:fontRef idx="minor">
+            <a:schemeClr val="lt1"/>
+          </a:fontRef>
+        </p:style>
+        <p:txBody>
+          <a:bodyPr rtlCol="0" anchor="ctr"/>
+          <a:lstStyle/>
+          <a:p>
+            <a:pPr algn="ctr"/>
+            <a:endParaRPr lang="zh-TW" altLang="en-US"/>
+          </a:p>
+        </p:txBody>
+      </p:sp>
+      <p:sp>
+        <p:nvSpPr>
+          <p:cNvPr id="12" name="矩形 11">
+            <a:extLst>
+              <a:ext uri="{FF2B5EF4-FFF2-40B4-BE49-F238E27FC236}">
+                <a16:creationId xmlns:a16="http://schemas.microsoft.com/office/drawing/2014/main" id="{362EEF16-CB3D-4AB9-86FA-122DA5D449BB}"/>
+              </a:ext>
+            </a:extLst>
+          </p:cNvPr>
+          <p:cNvSpPr/>
+          <p:nvPr/>
+        </p:nvSpPr>
+        <p:spPr>
+          <a:xfrm>
+            <a:off x="9799320" y="2297171"/>
+            <a:ext cx="365760" cy="335280"/>
+          </a:xfrm>
+          <a:prstGeom prst="rect">
+            <a:avLst/>
+          </a:prstGeom>
+          <a:solidFill>
+            <a:srgbClr val="FFFF00"/>
+          </a:solidFill>
+          <a:ln>
+            <a:noFill/>
+          </a:ln>
+        </p:spPr>
+        <p:style>
+          <a:lnRef idx="2">
+            <a:schemeClr val="accent1">
+              <a:shade val="50000"/>
+            </a:schemeClr>
+          </a:lnRef>
+          <a:fillRef idx="1">
+            <a:schemeClr val="accent1"/>
+          </a:fillRef>
+          <a:effectRef idx="0">
+            <a:schemeClr val="accent1"/>
+          </a:effectRef>
+          <a:fontRef idx="minor">
+            <a:schemeClr val="lt1"/>
+          </a:fontRef>
+        </p:style>
+        <p:txBody>
+          <a:bodyPr rtlCol="0" anchor="ctr"/>
+          <a:lstStyle/>
+          <a:p>
+            <a:pPr algn="ctr"/>
+            <a:endParaRPr lang="zh-TW" altLang="en-US"/>
+          </a:p>
+        </p:txBody>
+      </p:sp>
+      <p:sp>
+        <p:nvSpPr>
+          <p:cNvPr id="13" name="矩形 12">
+            <a:extLst>
+              <a:ext uri="{FF2B5EF4-FFF2-40B4-BE49-F238E27FC236}">
+                <a16:creationId xmlns:a16="http://schemas.microsoft.com/office/drawing/2014/main" id="{2B5B6676-74A1-4765-B223-7AAC64122A19}"/>
+              </a:ext>
+            </a:extLst>
+          </p:cNvPr>
+          <p:cNvSpPr/>
+          <p:nvPr/>
+        </p:nvSpPr>
+        <p:spPr>
+          <a:xfrm>
+            <a:off x="10165080" y="2297171"/>
+            <a:ext cx="365760" cy="335280"/>
+          </a:xfrm>
+          <a:prstGeom prst="rect">
+            <a:avLst/>
+          </a:prstGeom>
+          <a:ln>
+            <a:noFill/>
+          </a:ln>
+        </p:spPr>
+        <p:style>
+          <a:lnRef idx="2">
+            <a:schemeClr val="accent1">
+              <a:shade val="50000"/>
+            </a:schemeClr>
+          </a:lnRef>
+          <a:fillRef idx="1">
+            <a:schemeClr val="accent1"/>
+          </a:fillRef>
+          <a:effectRef idx="0">
+            <a:schemeClr val="accent1"/>
+          </a:effectRef>
+          <a:fontRef idx="minor">
+            <a:schemeClr val="lt1"/>
+          </a:fontRef>
+        </p:style>
+        <p:txBody>
+          <a:bodyPr rtlCol="0" anchor="ctr"/>
+          <a:lstStyle/>
+          <a:p>
+            <a:pPr algn="ctr"/>
+            <a:endParaRPr lang="zh-TW" altLang="en-US"/>
+          </a:p>
+        </p:txBody>
+      </p:sp>
+      <p:cxnSp>
+        <p:nvCxnSpPr>
+          <p:cNvPr id="15" name="直線單箭頭接點 14">
+            <a:extLst>
+              <a:ext uri="{FF2B5EF4-FFF2-40B4-BE49-F238E27FC236}">
+                <a16:creationId xmlns:a16="http://schemas.microsoft.com/office/drawing/2014/main" id="{D957B02F-77C2-4DAF-98D3-26E10AEE5FDE}"/>
+              </a:ext>
+            </a:extLst>
+          </p:cNvPr>
+          <p:cNvCxnSpPr>
+            <a:cxnSpLocks/>
+          </p:cNvCxnSpPr>
+          <p:nvPr/>
+        </p:nvCxnSpPr>
+        <p:spPr>
+          <a:xfrm>
+            <a:off x="10342880" y="1738371"/>
+            <a:ext cx="0" cy="457200"/>
+          </a:xfrm>
+          <a:prstGeom prst="straightConnector1">
+            <a:avLst/>
+          </a:prstGeom>
+          <a:ln>
+            <a:solidFill>
+              <a:schemeClr val="tx1"/>
+            </a:solidFill>
+            <a:tailEnd type="triangle"/>
+          </a:ln>
+        </p:spPr>
+        <p:style>
+          <a:lnRef idx="1">
+            <a:schemeClr val="accent1"/>
+          </a:lnRef>
+          <a:fillRef idx="0">
+            <a:schemeClr val="accent1"/>
+          </a:fillRef>
+          <a:effectRef idx="0">
+            <a:schemeClr val="accent1"/>
+          </a:effectRef>
+          <a:fontRef idx="minor">
+            <a:schemeClr val="tx1"/>
+          </a:fontRef>
+        </p:style>
+      </p:cxnSp>
+      <p:sp>
+        <p:nvSpPr>
+          <p:cNvPr id="17" name="矩形 16">
+            <a:extLst>
+              <a:ext uri="{FF2B5EF4-FFF2-40B4-BE49-F238E27FC236}">
+                <a16:creationId xmlns:a16="http://schemas.microsoft.com/office/drawing/2014/main" id="{9833C6C5-A45B-4F1F-B34F-97F8300CB025}"/>
+              </a:ext>
+            </a:extLst>
+          </p:cNvPr>
+          <p:cNvSpPr/>
+          <p:nvPr/>
+        </p:nvSpPr>
+        <p:spPr>
+          <a:xfrm>
+            <a:off x="9433560" y="3890270"/>
+            <a:ext cx="365760" cy="335280"/>
+          </a:xfrm>
+          <a:prstGeom prst="rect">
+            <a:avLst/>
+          </a:prstGeom>
+          <a:solidFill>
+            <a:srgbClr val="FF0000"/>
+          </a:solidFill>
+          <a:ln>
+            <a:noFill/>
+          </a:ln>
+        </p:spPr>
+        <p:style>
+          <a:lnRef idx="2">
+            <a:schemeClr val="accent1">
+              <a:shade val="50000"/>
+            </a:schemeClr>
+          </a:lnRef>
+          <a:fillRef idx="1">
+            <a:schemeClr val="accent1"/>
+          </a:fillRef>
+          <a:effectRef idx="0">
+            <a:schemeClr val="accent1"/>
+          </a:effectRef>
+          <a:fontRef idx="minor">
+            <a:schemeClr val="lt1"/>
+          </a:fontRef>
+        </p:style>
+        <p:txBody>
+          <a:bodyPr rtlCol="0" anchor="ctr"/>
+          <a:lstStyle/>
+          <a:p>
+            <a:pPr algn="ctr"/>
+            <a:endParaRPr lang="zh-TW" altLang="en-US"/>
+          </a:p>
+        </p:txBody>
+      </p:sp>
+      <p:sp>
+        <p:nvSpPr>
+          <p:cNvPr id="18" name="矩形 17">
+            <a:extLst>
+              <a:ext uri="{FF2B5EF4-FFF2-40B4-BE49-F238E27FC236}">
+                <a16:creationId xmlns:a16="http://schemas.microsoft.com/office/drawing/2014/main" id="{1362350A-99A8-479C-8D78-1CA374CFEE1E}"/>
+              </a:ext>
+            </a:extLst>
+          </p:cNvPr>
+          <p:cNvSpPr/>
+          <p:nvPr/>
+        </p:nvSpPr>
+        <p:spPr>
+          <a:xfrm>
+            <a:off x="9799320" y="3890270"/>
+            <a:ext cx="365760" cy="335280"/>
+          </a:xfrm>
+          <a:prstGeom prst="rect">
+            <a:avLst/>
+          </a:prstGeom>
+          <a:solidFill>
+            <a:srgbClr val="FFFF00"/>
+          </a:solidFill>
+          <a:ln>
+            <a:noFill/>
+          </a:ln>
+        </p:spPr>
+        <p:style>
+          <a:lnRef idx="2">
+            <a:schemeClr val="accent1">
+              <a:shade val="50000"/>
+            </a:schemeClr>
+          </a:lnRef>
+          <a:fillRef idx="1">
+            <a:schemeClr val="accent1"/>
+          </a:fillRef>
+          <a:effectRef idx="0">
+            <a:schemeClr val="accent1"/>
+          </a:effectRef>
+          <a:fontRef idx="minor">
+            <a:schemeClr val="lt1"/>
+          </a:fontRef>
+        </p:style>
+        <p:txBody>
+          <a:bodyPr rtlCol="0" anchor="ctr"/>
+          <a:lstStyle/>
+          <a:p>
+            <a:pPr algn="ctr"/>
+            <a:endParaRPr lang="zh-TW" altLang="en-US"/>
+          </a:p>
+        </p:txBody>
+      </p:sp>
+      <p:sp>
+        <p:nvSpPr>
+          <p:cNvPr id="19" name="矩形 18">
+            <a:extLst>
+              <a:ext uri="{FF2B5EF4-FFF2-40B4-BE49-F238E27FC236}">
+                <a16:creationId xmlns:a16="http://schemas.microsoft.com/office/drawing/2014/main" id="{2390A608-E90F-4E01-8DD3-83A3297A2307}"/>
+              </a:ext>
+            </a:extLst>
+          </p:cNvPr>
+          <p:cNvSpPr/>
+          <p:nvPr/>
+        </p:nvSpPr>
+        <p:spPr>
+          <a:xfrm>
+            <a:off x="10165080" y="3890270"/>
+            <a:ext cx="365760" cy="335280"/>
+          </a:xfrm>
+          <a:prstGeom prst="rect">
+            <a:avLst/>
+          </a:prstGeom>
+          <a:ln>
+            <a:noFill/>
+          </a:ln>
+        </p:spPr>
+        <p:style>
+          <a:lnRef idx="2">
+            <a:schemeClr val="accent1">
+              <a:shade val="50000"/>
+            </a:schemeClr>
+          </a:lnRef>
+          <a:fillRef idx="1">
+            <a:schemeClr val="accent1"/>
+          </a:fillRef>
+          <a:effectRef idx="0">
+            <a:schemeClr val="accent1"/>
+          </a:effectRef>
+          <a:fontRef idx="minor">
+            <a:schemeClr val="lt1"/>
+          </a:fontRef>
+        </p:style>
+        <p:txBody>
+          <a:bodyPr rtlCol="0" anchor="ctr"/>
+          <a:lstStyle/>
+          <a:p>
+            <a:pPr algn="ctr"/>
+            <a:endParaRPr lang="zh-TW" altLang="en-US"/>
+          </a:p>
+        </p:txBody>
+      </p:sp>
+      <p:cxnSp>
+        <p:nvCxnSpPr>
+          <p:cNvPr id="20" name="直線單箭頭接點 19">
+            <a:extLst>
+              <a:ext uri="{FF2B5EF4-FFF2-40B4-BE49-F238E27FC236}">
+                <a16:creationId xmlns:a16="http://schemas.microsoft.com/office/drawing/2014/main" id="{DA75CC86-3E89-4BA1-BAC5-5D4D732B5C58}"/>
+              </a:ext>
+            </a:extLst>
+          </p:cNvPr>
+          <p:cNvCxnSpPr>
+            <a:cxnSpLocks/>
+          </p:cNvCxnSpPr>
+          <p:nvPr/>
+        </p:nvCxnSpPr>
+        <p:spPr>
+          <a:xfrm>
+            <a:off x="9997440" y="3331470"/>
+            <a:ext cx="0" cy="457200"/>
+          </a:xfrm>
+          <a:prstGeom prst="straightConnector1">
+            <a:avLst/>
+          </a:prstGeom>
+          <a:ln>
+            <a:solidFill>
+              <a:schemeClr val="tx1"/>
+            </a:solidFill>
+            <a:tailEnd type="triangle"/>
+          </a:ln>
+        </p:spPr>
+        <p:style>
+          <a:lnRef idx="1">
+            <a:schemeClr val="accent1"/>
+          </a:lnRef>
+          <a:fillRef idx="0">
+            <a:schemeClr val="accent1"/>
+          </a:fillRef>
+          <a:effectRef idx="0">
+            <a:schemeClr val="accent1"/>
+          </a:effectRef>
+          <a:fontRef idx="minor">
+            <a:schemeClr val="tx1"/>
+          </a:fontRef>
+        </p:style>
+      </p:cxnSp>
+      <p:sp>
+        <p:nvSpPr>
+          <p:cNvPr id="21" name="矩形 20">
+            <a:extLst>
+              <a:ext uri="{FF2B5EF4-FFF2-40B4-BE49-F238E27FC236}">
+                <a16:creationId xmlns:a16="http://schemas.microsoft.com/office/drawing/2014/main" id="{D1897AD0-5BE9-403A-AC6C-A8E93C2EE50A}"/>
+              </a:ext>
+            </a:extLst>
+          </p:cNvPr>
+          <p:cNvSpPr/>
+          <p:nvPr/>
+        </p:nvSpPr>
+        <p:spPr>
+          <a:xfrm>
+            <a:off x="9433560" y="5584190"/>
+            <a:ext cx="365760" cy="335280"/>
+          </a:xfrm>
+          <a:prstGeom prst="rect">
+            <a:avLst/>
+          </a:prstGeom>
+          <a:solidFill>
+            <a:srgbClr val="FF0000"/>
+          </a:solidFill>
+          <a:ln>
+            <a:noFill/>
+          </a:ln>
+        </p:spPr>
+        <p:style>
+          <a:lnRef idx="2">
+            <a:schemeClr val="accent1">
+              <a:shade val="50000"/>
+            </a:schemeClr>
+          </a:lnRef>
+          <a:fillRef idx="1">
+            <a:schemeClr val="accent1"/>
+          </a:fillRef>
+          <a:effectRef idx="0">
+            <a:schemeClr val="accent1"/>
+          </a:effectRef>
+          <a:fontRef idx="minor">
+            <a:schemeClr val="lt1"/>
+          </a:fontRef>
+        </p:style>
+        <p:txBody>
+          <a:bodyPr rtlCol="0" anchor="ctr"/>
+          <a:lstStyle/>
+          <a:p>
+            <a:pPr algn="ctr"/>
+            <a:endParaRPr lang="zh-TW" altLang="en-US"/>
+          </a:p>
+        </p:txBody>
+      </p:sp>
+      <p:sp>
+        <p:nvSpPr>
+          <p:cNvPr id="22" name="矩形 21">
+            <a:extLst>
+              <a:ext uri="{FF2B5EF4-FFF2-40B4-BE49-F238E27FC236}">
+                <a16:creationId xmlns:a16="http://schemas.microsoft.com/office/drawing/2014/main" id="{225EACAB-C416-4F30-A9A9-F65519F35BE2}"/>
+              </a:ext>
+            </a:extLst>
+          </p:cNvPr>
+          <p:cNvSpPr/>
+          <p:nvPr/>
+        </p:nvSpPr>
+        <p:spPr>
+          <a:xfrm>
+            <a:off x="9799320" y="5584190"/>
+            <a:ext cx="365760" cy="335280"/>
+          </a:xfrm>
+          <a:prstGeom prst="rect">
+            <a:avLst/>
+          </a:prstGeom>
+          <a:solidFill>
+            <a:srgbClr val="FFFF00"/>
+          </a:solidFill>
+          <a:ln>
+            <a:noFill/>
+          </a:ln>
+        </p:spPr>
+        <p:style>
+          <a:lnRef idx="2">
+            <a:schemeClr val="accent1">
+              <a:shade val="50000"/>
+            </a:schemeClr>
+          </a:lnRef>
+          <a:fillRef idx="1">
+            <a:schemeClr val="accent1"/>
+          </a:fillRef>
+          <a:effectRef idx="0">
+            <a:schemeClr val="accent1"/>
+          </a:effectRef>
+          <a:fontRef idx="minor">
+            <a:schemeClr val="lt1"/>
+          </a:fontRef>
+        </p:style>
+        <p:txBody>
+          <a:bodyPr rtlCol="0" anchor="ctr"/>
+          <a:lstStyle/>
+          <a:p>
+            <a:pPr algn="ctr"/>
+            <a:endParaRPr lang="zh-TW" altLang="en-US"/>
+          </a:p>
+        </p:txBody>
+      </p:sp>
+      <p:sp>
+        <p:nvSpPr>
+          <p:cNvPr id="23" name="矩形 22">
+            <a:extLst>
+              <a:ext uri="{FF2B5EF4-FFF2-40B4-BE49-F238E27FC236}">
+                <a16:creationId xmlns:a16="http://schemas.microsoft.com/office/drawing/2014/main" id="{2FC1E536-34B3-43A5-A476-6B9CDCAACDD7}"/>
+              </a:ext>
+            </a:extLst>
+          </p:cNvPr>
+          <p:cNvSpPr/>
+          <p:nvPr/>
+        </p:nvSpPr>
+        <p:spPr>
+          <a:xfrm>
+            <a:off x="10165080" y="5584190"/>
+            <a:ext cx="365760" cy="335280"/>
+          </a:xfrm>
+          <a:prstGeom prst="rect">
+            <a:avLst/>
+          </a:prstGeom>
+          <a:ln>
+            <a:noFill/>
+          </a:ln>
+        </p:spPr>
+        <p:style>
+          <a:lnRef idx="2">
+            <a:schemeClr val="accent1">
+              <a:shade val="50000"/>
+            </a:schemeClr>
+          </a:lnRef>
+          <a:fillRef idx="1">
+            <a:schemeClr val="accent1"/>
+          </a:fillRef>
+          <a:effectRef idx="0">
+            <a:schemeClr val="accent1"/>
+          </a:effectRef>
+          <a:fontRef idx="minor">
+            <a:schemeClr val="lt1"/>
+          </a:fontRef>
+        </p:style>
+        <p:txBody>
+          <a:bodyPr rtlCol="0" anchor="ctr"/>
+          <a:lstStyle/>
+          <a:p>
+            <a:pPr algn="ctr"/>
+            <a:endParaRPr lang="zh-TW" altLang="en-US"/>
+          </a:p>
+        </p:txBody>
+      </p:sp>
+      <p:cxnSp>
+        <p:nvCxnSpPr>
+          <p:cNvPr id="24" name="直線單箭頭接點 23">
+            <a:extLst>
+              <a:ext uri="{FF2B5EF4-FFF2-40B4-BE49-F238E27FC236}">
+                <a16:creationId xmlns:a16="http://schemas.microsoft.com/office/drawing/2014/main" id="{81650926-B03B-42DE-A42F-E390DC1143FD}"/>
+              </a:ext>
+            </a:extLst>
+          </p:cNvPr>
+          <p:cNvCxnSpPr>
+            <a:cxnSpLocks/>
+          </p:cNvCxnSpPr>
+          <p:nvPr/>
+        </p:nvCxnSpPr>
+        <p:spPr>
+          <a:xfrm>
+            <a:off x="9601200" y="5035550"/>
+            <a:ext cx="0" cy="457200"/>
+          </a:xfrm>
+          <a:prstGeom prst="straightConnector1">
+            <a:avLst/>
+          </a:prstGeom>
+          <a:ln>
+            <a:solidFill>
+              <a:schemeClr val="tx1"/>
+            </a:solidFill>
+            <a:tailEnd type="triangle"/>
+          </a:ln>
+        </p:spPr>
+        <p:style>
+          <a:lnRef idx="1">
+            <a:schemeClr val="accent1"/>
+          </a:lnRef>
+          <a:fillRef idx="0">
+            <a:schemeClr val="accent1"/>
+          </a:fillRef>
+          <a:effectRef idx="0">
+            <a:schemeClr val="accent1"/>
+          </a:effectRef>
+          <a:fontRef idx="minor">
+            <a:schemeClr val="tx1"/>
+          </a:fontRef>
+        </p:style>
+      </p:cxnSp>
+      <p:sp>
+        <p:nvSpPr>
+          <p:cNvPr id="25" name="文字方塊 24">
+            <a:extLst>
+              <a:ext uri="{FF2B5EF4-FFF2-40B4-BE49-F238E27FC236}">
+                <a16:creationId xmlns:a16="http://schemas.microsoft.com/office/drawing/2014/main" id="{2EB5766C-9241-42CE-AEAB-0D6CE7642C1B}"/>
+              </a:ext>
+            </a:extLst>
+          </p:cNvPr>
+          <p:cNvSpPr txBox="1"/>
+          <p:nvPr/>
+        </p:nvSpPr>
+        <p:spPr>
+          <a:xfrm>
+            <a:off x="10090246" y="1413486"/>
+            <a:ext cx="505267" cy="369332"/>
+          </a:xfrm>
+          <a:prstGeom prst="rect">
+            <a:avLst/>
+          </a:prstGeom>
+          <a:noFill/>
+        </p:spPr>
+        <p:txBody>
+          <a:bodyPr wrap="none" rtlCol="0">
+            <a:spAutoFit/>
+          </a:bodyPr>
+          <a:lstStyle/>
+          <a:p>
+            <a:r>
+              <a:rPr lang="en-US" altLang="zh-TW" dirty="0"/>
+              <a:t>pos</a:t>
+            </a:r>
+            <a:endParaRPr lang="zh-TW" altLang="en-US" dirty="0"/>
+          </a:p>
+        </p:txBody>
+      </p:sp>
+    </p:spTree>
+    <p:extLst>
+      <p:ext uri="{BB962C8B-B14F-4D97-AF65-F5344CB8AC3E}">
+        <p14:creationId xmlns:p14="http://schemas.microsoft.com/office/powerpoint/2010/main" val="3707102231"/>
+      </p:ext>
+    </p:extLst>
+  </p:cSld>
+  <p:clrMapOvr>
+    <a:masterClrMapping/>
+  </p:clrMapOvr>
+  <mc:AlternateContent xmlns:mc="http://schemas.openxmlformats.org/markup-compatibility/2006" xmlns:p14="http://schemas.microsoft.com/office/powerpoint/2010/main">
+    <mc:Choice Requires="p14">
+      <p:transition spd="slow" p14:dur="2000">
+        <p:cut/>
+      </p:transition>
+    </mc:Choice>
+    <mc:Fallback xmlns="">
+      <p:transition spd="slow">
+        <p:cut/>
+      </p:transition>
+    </mc:Fallback>
+  </mc:AlternateContent>
+</p:sld>
+</file>
+
 <file path=ppt/slides/slide18.xml><?xml version="1.0" encoding="utf-8"?>
 <p:sld xmlns:a="http://schemas.openxmlformats.org/drawingml/2006/main" xmlns:r="http://schemas.openxmlformats.org/officeDocument/2006/relationships" xmlns:p="http://schemas.openxmlformats.org/presentationml/2006/main">
   <p:cSld>
@@ -7607,7 +8978,7 @@
           <p:cNvPr id="2" name="標題 1">
             <a:extLst>
               <a:ext uri="{FF2B5EF4-FFF2-40B4-BE49-F238E27FC236}">
-                <a16:creationId xmlns:a16="http://schemas.microsoft.com/office/drawing/2014/main" id="{5F0ED300-12DB-475F-9456-FEF53B5CB91F}"/>
+                <a16:creationId xmlns:a16="http://schemas.microsoft.com/office/drawing/2014/main" id="{B5489B3D-AB8A-4F74-935C-32352690F743}"/>
               </a:ext>
             </a:extLst>
           </p:cNvPr>
@@ -7624,8 +8995,16 @@
           <a:lstStyle/>
           <a:p>
             <a:r>
-              <a:rPr lang="en-US" altLang="zh-TW" dirty="0"/>
-              <a:t>Algorithm</a:t>
+              <a:rPr lang="en-US" altLang="zh-TW" dirty="0" err="1"/>
+              <a:t>Cython</a:t>
+            </a:r>
+            <a:r>
+              <a:rPr lang="zh-TW" altLang="en-US" dirty="0"/>
+              <a:t> </a:t>
+            </a:r>
+            <a:r>
+              <a:rPr lang="en-US" altLang="zh-TW" dirty="0"/>
+              <a:t>Code</a:t>
             </a:r>
             <a:endParaRPr lang="zh-TW" altLang="en-US" dirty="0"/>
           </a:p>
@@ -7636,7 +9015,7 @@
           <p:cNvPr id="3" name="內容版面配置區 2">
             <a:extLst>
               <a:ext uri="{FF2B5EF4-FFF2-40B4-BE49-F238E27FC236}">
-                <a16:creationId xmlns:a16="http://schemas.microsoft.com/office/drawing/2014/main" id="{0BBB9135-B528-4FDE-81B4-858A33C05980}"/>
+                <a16:creationId xmlns:a16="http://schemas.microsoft.com/office/drawing/2014/main" id="{DEB53B4F-3A50-4588-8FC8-FF2FAF4ACA2B}"/>
               </a:ext>
             </a:extLst>
           </p:cNvPr>
@@ -7661,7 +9040,7 @@
           <p:cNvPr id="4" name="投影片編號版面配置區 3">
             <a:extLst>
               <a:ext uri="{FF2B5EF4-FFF2-40B4-BE49-F238E27FC236}">
-                <a16:creationId xmlns:a16="http://schemas.microsoft.com/office/drawing/2014/main" id="{CCF9D7BA-06A9-41D5-BCEF-E0A8E5F054EE}"/>
+                <a16:creationId xmlns:a16="http://schemas.microsoft.com/office/drawing/2014/main" id="{90CF8EB3-EF66-47D5-B9A6-FC84C40AF623}"/>
               </a:ext>
             </a:extLst>
           </p:cNvPr>
@@ -7685,10 +9064,137 @@
           </a:p>
         </p:txBody>
       </p:sp>
+      <p:pic>
+        <p:nvPicPr>
+          <p:cNvPr id="8" name="圖片 7">
+            <a:extLst>
+              <a:ext uri="{FF2B5EF4-FFF2-40B4-BE49-F238E27FC236}">
+                <a16:creationId xmlns:a16="http://schemas.microsoft.com/office/drawing/2014/main" id="{1909E390-9D32-4010-B726-483B16CF2677}"/>
+              </a:ext>
+            </a:extLst>
+          </p:cNvPr>
+          <p:cNvPicPr>
+            <a:picLocks noChangeAspect="1"/>
+          </p:cNvPicPr>
+          <p:nvPr/>
+        </p:nvPicPr>
+        <p:blipFill>
+          <a:blip r:embed="rId2"/>
+          <a:stretch>
+            <a:fillRect/>
+          </a:stretch>
+        </p:blipFill>
+        <p:spPr>
+          <a:xfrm>
+            <a:off x="0" y="1870075"/>
+            <a:ext cx="12192000" cy="4271704"/>
+          </a:xfrm>
+          <a:prstGeom prst="rect">
+            <a:avLst/>
+          </a:prstGeom>
+        </p:spPr>
+      </p:pic>
+      <p:sp>
+        <p:nvSpPr>
+          <p:cNvPr id="6" name="矩形: 圓角 5">
+            <a:extLst>
+              <a:ext uri="{FF2B5EF4-FFF2-40B4-BE49-F238E27FC236}">
+                <a16:creationId xmlns:a16="http://schemas.microsoft.com/office/drawing/2014/main" id="{8A8B49DF-6B69-4273-8A9E-217469BE6149}"/>
+              </a:ext>
+            </a:extLst>
+          </p:cNvPr>
+          <p:cNvSpPr/>
+          <p:nvPr/>
+        </p:nvSpPr>
+        <p:spPr>
+          <a:xfrm>
+            <a:off x="2692400" y="2715578"/>
+            <a:ext cx="1290320" cy="220662"/>
+          </a:xfrm>
+          <a:prstGeom prst="roundRect">
+            <a:avLst/>
+          </a:prstGeom>
+          <a:solidFill>
+            <a:srgbClr val="FFFF00">
+              <a:alpha val="40000"/>
+            </a:srgbClr>
+          </a:solidFill>
+          <a:ln>
+            <a:noFill/>
+          </a:ln>
+        </p:spPr>
+        <p:style>
+          <a:lnRef idx="2">
+            <a:schemeClr val="accent1">
+              <a:shade val="50000"/>
+            </a:schemeClr>
+          </a:lnRef>
+          <a:fillRef idx="1">
+            <a:schemeClr val="accent1"/>
+          </a:fillRef>
+          <a:effectRef idx="0">
+            <a:schemeClr val="accent1"/>
+          </a:effectRef>
+          <a:fontRef idx="minor">
+            <a:schemeClr val="lt1"/>
+          </a:fontRef>
+        </p:style>
+        <p:txBody>
+          <a:bodyPr rtlCol="0" anchor="ctr"/>
+          <a:lstStyle/>
+          <a:p>
+            <a:pPr algn="ctr"/>
+            <a:endParaRPr lang="zh-TW" altLang="en-US"/>
+          </a:p>
+        </p:txBody>
+      </p:sp>
+      <p:sp>
+        <p:nvSpPr>
+          <p:cNvPr id="7" name="矩形 6">
+            <a:extLst>
+              <a:ext uri="{FF2B5EF4-FFF2-40B4-BE49-F238E27FC236}">
+                <a16:creationId xmlns:a16="http://schemas.microsoft.com/office/drawing/2014/main" id="{69319157-22CE-4348-8931-D579BB0E601B}"/>
+              </a:ext>
+            </a:extLst>
+          </p:cNvPr>
+          <p:cNvSpPr/>
+          <p:nvPr/>
+        </p:nvSpPr>
+        <p:spPr>
+          <a:xfrm>
+            <a:off x="0" y="1456293"/>
+            <a:ext cx="1826141" cy="369332"/>
+          </a:xfrm>
+          <a:prstGeom prst="rect">
+            <a:avLst/>
+          </a:prstGeom>
+        </p:spPr>
+        <p:txBody>
+          <a:bodyPr wrap="none">
+            <a:spAutoFit/>
+          </a:bodyPr>
+          <a:lstStyle/>
+          <a:p>
+            <a:r>
+              <a:rPr lang="en-US" altLang="zh-TW" dirty="0" err="1"/>
+              <a:t>my_research</a:t>
+            </a:r>
+            <a:r>
+              <a:rPr lang="zh-TW" altLang="en-US" dirty="0"/>
+              <a:t>.py</a:t>
+            </a:r>
+            <a:r>
+              <a:rPr lang="en-US" altLang="zh-TW" dirty="0"/>
+              <a:t>x</a:t>
+            </a:r>
+            <a:endParaRPr lang="zh-TW" altLang="en-US" dirty="0"/>
+          </a:p>
+        </p:txBody>
+      </p:sp>
     </p:spTree>
     <p:extLst>
       <p:ext uri="{BB962C8B-B14F-4D97-AF65-F5344CB8AC3E}">
-        <p14:creationId xmlns:p14="http://schemas.microsoft.com/office/powerpoint/2010/main" val="3707102231"/>
+        <p14:creationId xmlns:p14="http://schemas.microsoft.com/office/powerpoint/2010/main" val="3827112877"/>
       </p:ext>
     </p:extLst>
   </p:cSld>
@@ -7732,7 +9238,7 @@
           <p:cNvPr id="2" name="標題 1">
             <a:extLst>
               <a:ext uri="{FF2B5EF4-FFF2-40B4-BE49-F238E27FC236}">
-                <a16:creationId xmlns:a16="http://schemas.microsoft.com/office/drawing/2014/main" id="{B5489B3D-AB8A-4F74-935C-32352690F743}"/>
+                <a16:creationId xmlns:a16="http://schemas.microsoft.com/office/drawing/2014/main" id="{26587311-4783-472A-8B3F-C83460B64E1E}"/>
               </a:ext>
             </a:extLst>
           </p:cNvPr>
@@ -7749,8 +9255,8 @@
           <a:lstStyle/>
           <a:p>
             <a:r>
-              <a:rPr lang="en-US" altLang="zh-TW" dirty="0" err="1"/>
-              <a:t>Cython</a:t>
+              <a:rPr lang="en-US" altLang="zh-TW" dirty="0"/>
+              <a:t>In</a:t>
             </a:r>
             <a:r>
               <a:rPr lang="zh-TW" altLang="en-US" dirty="0"/>
@@ -7758,7 +9264,7 @@
             </a:r>
             <a:r>
               <a:rPr lang="en-US" altLang="zh-TW" dirty="0"/>
-              <a:t>Code</a:t>
+              <a:t>Python…</a:t>
             </a:r>
             <a:endParaRPr lang="zh-TW" altLang="en-US" dirty="0"/>
           </a:p>
@@ -7769,7 +9275,7 @@
           <p:cNvPr id="3" name="內容版面配置區 2">
             <a:extLst>
               <a:ext uri="{FF2B5EF4-FFF2-40B4-BE49-F238E27FC236}">
-                <a16:creationId xmlns:a16="http://schemas.microsoft.com/office/drawing/2014/main" id="{DEB53B4F-3A50-4588-8FC8-FF2FAF4ACA2B}"/>
+                <a16:creationId xmlns:a16="http://schemas.microsoft.com/office/drawing/2014/main" id="{385E664A-D870-48B0-AD40-E5C19C3A6DC5}"/>
               </a:ext>
             </a:extLst>
           </p:cNvPr>
@@ -7794,7 +9300,7 @@
           <p:cNvPr id="4" name="投影片編號版面配置區 3">
             <a:extLst>
               <a:ext uri="{FF2B5EF4-FFF2-40B4-BE49-F238E27FC236}">
-                <a16:creationId xmlns:a16="http://schemas.microsoft.com/office/drawing/2014/main" id="{90CF8EB3-EF66-47D5-B9A6-FC84C40AF623}"/>
+                <a16:creationId xmlns:a16="http://schemas.microsoft.com/office/drawing/2014/main" id="{8F128DBC-A6C0-424E-8F5A-21CC31232479}"/>
               </a:ext>
             </a:extLst>
           </p:cNvPr>
@@ -7820,10 +9326,10 @@
       </p:sp>
       <p:pic>
         <p:nvPicPr>
-          <p:cNvPr id="8" name="圖片 7">
-            <a:extLst>
-              <a:ext uri="{FF2B5EF4-FFF2-40B4-BE49-F238E27FC236}">
-                <a16:creationId xmlns:a16="http://schemas.microsoft.com/office/drawing/2014/main" id="{1909E390-9D32-4010-B726-483B16CF2677}"/>
+          <p:cNvPr id="7" name="圖片 6">
+            <a:extLst>
+              <a:ext uri="{FF2B5EF4-FFF2-40B4-BE49-F238E27FC236}">
+                <a16:creationId xmlns:a16="http://schemas.microsoft.com/office/drawing/2014/main" id="{258C7771-3A1E-453E-A13A-F37084DE44E2}"/>
               </a:ext>
             </a:extLst>
           </p:cNvPr>
@@ -7840,8 +9346,8 @@
         </p:blipFill>
         <p:spPr>
           <a:xfrm>
-            <a:off x="0" y="1870075"/>
-            <a:ext cx="12192000" cy="4271704"/>
+            <a:off x="0" y="1591338"/>
+            <a:ext cx="12192000" cy="4585625"/>
           </a:xfrm>
           <a:prstGeom prst="rect">
             <a:avLst/>
@@ -7853,7 +9359,7 @@
           <p:cNvPr id="6" name="矩形: 圓角 5">
             <a:extLst>
               <a:ext uri="{FF2B5EF4-FFF2-40B4-BE49-F238E27FC236}">
-                <a16:creationId xmlns:a16="http://schemas.microsoft.com/office/drawing/2014/main" id="{8A8B49DF-6B69-4273-8A9E-217469BE6149}"/>
+                <a16:creationId xmlns:a16="http://schemas.microsoft.com/office/drawing/2014/main" id="{5F355C54-50DB-4830-9429-290ADC51F589}"/>
               </a:ext>
             </a:extLst>
           </p:cNvPr>
@@ -7862,8 +9368,8 @@
         </p:nvSpPr>
         <p:spPr>
           <a:xfrm>
-            <a:off x="2692400" y="2715578"/>
-            <a:ext cx="1290320" cy="220662"/>
+            <a:off x="1615440" y="3837861"/>
+            <a:ext cx="1605280" cy="297260"/>
           </a:xfrm>
           <a:prstGeom prst="roundRect">
             <a:avLst/>
@@ -7905,7 +9411,7 @@
     </p:spTree>
     <p:extLst>
       <p:ext uri="{BB962C8B-B14F-4D97-AF65-F5344CB8AC3E}">
-        <p14:creationId xmlns:p14="http://schemas.microsoft.com/office/powerpoint/2010/main" val="3827112877"/>
+        <p14:creationId xmlns:p14="http://schemas.microsoft.com/office/powerpoint/2010/main" val="2535991705"/>
       </p:ext>
     </p:extLst>
   </p:cSld>
@@ -8109,220 +9615,6 @@
           <p:cNvPr id="2" name="標題 1">
             <a:extLst>
               <a:ext uri="{FF2B5EF4-FFF2-40B4-BE49-F238E27FC236}">
-                <a16:creationId xmlns:a16="http://schemas.microsoft.com/office/drawing/2014/main" id="{26587311-4783-472A-8B3F-C83460B64E1E}"/>
-              </a:ext>
-            </a:extLst>
-          </p:cNvPr>
-          <p:cNvSpPr>
-            <a:spLocks noGrp="1"/>
-          </p:cNvSpPr>
-          <p:nvPr>
-            <p:ph type="title"/>
-          </p:nvPr>
-        </p:nvSpPr>
-        <p:spPr/>
-        <p:txBody>
-          <a:bodyPr/>
-          <a:lstStyle/>
-          <a:p>
-            <a:r>
-              <a:rPr lang="en-US" altLang="zh-TW" dirty="0"/>
-              <a:t>In</a:t>
-            </a:r>
-            <a:r>
-              <a:rPr lang="zh-TW" altLang="en-US" dirty="0"/>
-              <a:t> </a:t>
-            </a:r>
-            <a:r>
-              <a:rPr lang="en-US" altLang="zh-TW" dirty="0"/>
-              <a:t>Python…</a:t>
-            </a:r>
-            <a:endParaRPr lang="zh-TW" altLang="en-US" dirty="0"/>
-          </a:p>
-        </p:txBody>
-      </p:sp>
-      <p:sp>
-        <p:nvSpPr>
-          <p:cNvPr id="3" name="內容版面配置區 2">
-            <a:extLst>
-              <a:ext uri="{FF2B5EF4-FFF2-40B4-BE49-F238E27FC236}">
-                <a16:creationId xmlns:a16="http://schemas.microsoft.com/office/drawing/2014/main" id="{385E664A-D870-48B0-AD40-E5C19C3A6DC5}"/>
-              </a:ext>
-            </a:extLst>
-          </p:cNvPr>
-          <p:cNvSpPr>
-            <a:spLocks noGrp="1"/>
-          </p:cNvSpPr>
-          <p:nvPr>
-            <p:ph idx="1"/>
-          </p:nvPr>
-        </p:nvSpPr>
-        <p:spPr/>
-        <p:txBody>
-          <a:bodyPr/>
-          <a:lstStyle/>
-          <a:p>
-            <a:endParaRPr lang="zh-TW" altLang="en-US"/>
-          </a:p>
-        </p:txBody>
-      </p:sp>
-      <p:sp>
-        <p:nvSpPr>
-          <p:cNvPr id="4" name="投影片編號版面配置區 3">
-            <a:extLst>
-              <a:ext uri="{FF2B5EF4-FFF2-40B4-BE49-F238E27FC236}">
-                <a16:creationId xmlns:a16="http://schemas.microsoft.com/office/drawing/2014/main" id="{8F128DBC-A6C0-424E-8F5A-21CC31232479}"/>
-              </a:ext>
-            </a:extLst>
-          </p:cNvPr>
-          <p:cNvSpPr>
-            <a:spLocks noGrp="1"/>
-          </p:cNvSpPr>
-          <p:nvPr>
-            <p:ph type="sldNum" sz="quarter" idx="12"/>
-          </p:nvPr>
-        </p:nvSpPr>
-        <p:spPr/>
-        <p:txBody>
-          <a:bodyPr/>
-          <a:lstStyle/>
-          <a:p>
-            <a:fld id="{D28B8240-4ECF-41F4-B10D-8095B57EA97A}" type="slidenum">
-              <a:rPr lang="zh-TW" altLang="en-US" smtClean="0"/>
-              <a:t>20</a:t>
-            </a:fld>
-            <a:endParaRPr lang="zh-TW" altLang="en-US"/>
-          </a:p>
-        </p:txBody>
-      </p:sp>
-      <p:pic>
-        <p:nvPicPr>
-          <p:cNvPr id="5" name="圖片 4">
-            <a:extLst>
-              <a:ext uri="{FF2B5EF4-FFF2-40B4-BE49-F238E27FC236}">
-                <a16:creationId xmlns:a16="http://schemas.microsoft.com/office/drawing/2014/main" id="{30C23D53-D4DE-476A-A16E-62D9E4BC716F}"/>
-              </a:ext>
-            </a:extLst>
-          </p:cNvPr>
-          <p:cNvPicPr>
-            <a:picLocks noChangeAspect="1"/>
-          </p:cNvPicPr>
-          <p:nvPr/>
-        </p:nvPicPr>
-        <p:blipFill>
-          <a:blip r:embed="rId2"/>
-          <a:stretch>
-            <a:fillRect/>
-          </a:stretch>
-        </p:blipFill>
-        <p:spPr>
-          <a:xfrm>
-            <a:off x="0" y="1544669"/>
-            <a:ext cx="12192000" cy="5313331"/>
-          </a:xfrm>
-          <a:prstGeom prst="rect">
-            <a:avLst/>
-          </a:prstGeom>
-        </p:spPr>
-      </p:pic>
-      <p:sp>
-        <p:nvSpPr>
-          <p:cNvPr id="6" name="矩形: 圓角 5">
-            <a:extLst>
-              <a:ext uri="{FF2B5EF4-FFF2-40B4-BE49-F238E27FC236}">
-                <a16:creationId xmlns:a16="http://schemas.microsoft.com/office/drawing/2014/main" id="{5F355C54-50DB-4830-9429-290ADC51F589}"/>
-              </a:ext>
-            </a:extLst>
-          </p:cNvPr>
-          <p:cNvSpPr/>
-          <p:nvPr/>
-        </p:nvSpPr>
-        <p:spPr>
-          <a:xfrm>
-            <a:off x="1960880" y="4001294"/>
-            <a:ext cx="1960880" cy="326866"/>
-          </a:xfrm>
-          <a:prstGeom prst="roundRect">
-            <a:avLst/>
-          </a:prstGeom>
-          <a:solidFill>
-            <a:srgbClr val="FFFF00">
-              <a:alpha val="40000"/>
-            </a:srgbClr>
-          </a:solidFill>
-        </p:spPr>
-        <p:style>
-          <a:lnRef idx="2">
-            <a:schemeClr val="accent1">
-              <a:shade val="50000"/>
-            </a:schemeClr>
-          </a:lnRef>
-          <a:fillRef idx="1">
-            <a:schemeClr val="accent1"/>
-          </a:fillRef>
-          <a:effectRef idx="0">
-            <a:schemeClr val="accent1"/>
-          </a:effectRef>
-          <a:fontRef idx="minor">
-            <a:schemeClr val="lt1"/>
-          </a:fontRef>
-        </p:style>
-        <p:txBody>
-          <a:bodyPr rtlCol="0" anchor="ctr"/>
-          <a:lstStyle/>
-          <a:p>
-            <a:pPr algn="ctr"/>
-            <a:endParaRPr lang="zh-TW" altLang="en-US"/>
-          </a:p>
-        </p:txBody>
-      </p:sp>
-    </p:spTree>
-    <p:extLst>
-      <p:ext uri="{BB962C8B-B14F-4D97-AF65-F5344CB8AC3E}">
-        <p14:creationId xmlns:p14="http://schemas.microsoft.com/office/powerpoint/2010/main" val="2535991705"/>
-      </p:ext>
-    </p:extLst>
-  </p:cSld>
-  <p:clrMapOvr>
-    <a:masterClrMapping/>
-  </p:clrMapOvr>
-  <mc:AlternateContent xmlns:mc="http://schemas.openxmlformats.org/markup-compatibility/2006" xmlns:p14="http://schemas.microsoft.com/office/powerpoint/2010/main">
-    <mc:Choice Requires="p14">
-      <p:transition spd="slow" p14:dur="2000">
-        <p:cut/>
-      </p:transition>
-    </mc:Choice>
-    <mc:Fallback xmlns="">
-      <p:transition spd="slow">
-        <p:cut/>
-      </p:transition>
-    </mc:Fallback>
-  </mc:AlternateContent>
-</p:sld>
-</file>
-
-<file path=ppt/slides/slide21.xml><?xml version="1.0" encoding="utf-8"?>
-<p:sld xmlns:a="http://schemas.openxmlformats.org/drawingml/2006/main" xmlns:r="http://schemas.openxmlformats.org/officeDocument/2006/relationships" xmlns:p="http://schemas.openxmlformats.org/presentationml/2006/main">
-  <p:cSld>
-    <p:spTree>
-      <p:nvGrpSpPr>
-        <p:cNvPr id="1" name=""/>
-        <p:cNvGrpSpPr/>
-        <p:nvPr/>
-      </p:nvGrpSpPr>
-      <p:grpSpPr>
-        <a:xfrm>
-          <a:off x="0" y="0"/>
-          <a:ext cx="0" cy="0"/>
-          <a:chOff x="0" y="0"/>
-          <a:chExt cx="0" cy="0"/>
-        </a:xfrm>
-      </p:grpSpPr>
-      <p:sp>
-        <p:nvSpPr>
-          <p:cNvPr id="2" name="標題 1">
-            <a:extLst>
-              <a:ext uri="{FF2B5EF4-FFF2-40B4-BE49-F238E27FC236}">
                 <a16:creationId xmlns:a16="http://schemas.microsoft.com/office/drawing/2014/main" id="{8A2C9E51-1288-477C-8185-F2640B31B3C6}"/>
               </a:ext>
             </a:extLst>
@@ -8422,7 +9714,38 @@
             <a:endParaRPr lang="en-US" altLang="zh-TW" dirty="0"/>
           </a:p>
           <a:p>
-            <a:endParaRPr lang="en-US" altLang="zh-TW" dirty="0"/>
+            <a:r>
+              <a:rPr lang="en-US" altLang="zh-TW" dirty="0" err="1"/>
+              <a:t>Cython</a:t>
+            </a:r>
+            <a:r>
+              <a:rPr lang="en-US" altLang="zh-TW" dirty="0"/>
+              <a:t> - A guide for Python programmers</a:t>
+            </a:r>
+            <a:r>
+              <a:rPr lang="zh-TW" altLang="en-US" dirty="0"/>
+              <a:t> </a:t>
+            </a:r>
+            <a:r>
+              <a:rPr lang="en-US" altLang="zh-TW" dirty="0"/>
+              <a:t>(2015)</a:t>
+            </a:r>
+            <a:r>
+              <a:rPr lang="zh-TW" altLang="en-US" dirty="0"/>
+              <a:t> </a:t>
+            </a:r>
+            <a:r>
+              <a:rPr lang="en-US" altLang="zh-TW" dirty="0"/>
+              <a:t>by</a:t>
+            </a:r>
+            <a:r>
+              <a:rPr lang="zh-TW" altLang="en-US" dirty="0"/>
+              <a:t> </a:t>
+            </a:r>
+            <a:r>
+              <a:rPr lang="en-US" altLang="zh-TW" dirty="0"/>
+              <a:t>Kurt W. Smith</a:t>
+            </a:r>
           </a:p>
           <a:p>
             <a:endParaRPr lang="en-US" altLang="zh-TW" dirty="0"/>
@@ -8455,7 +9778,7 @@
           <a:p>
             <a:fld id="{D28B8240-4ECF-41F4-B10D-8095B57EA97A}" type="slidenum">
               <a:rPr lang="zh-TW" altLang="en-US" smtClean="0"/>
-              <a:t>21</a:t>
+              <a:t>20</a:t>
             </a:fld>
             <a:endParaRPr lang="zh-TW" altLang="en-US"/>
           </a:p>
@@ -8778,131 +10101,24 @@
             </a:r>
           </a:p>
           <a:p>
-            <a:r>
-              <a:rPr lang="en-US" altLang="zh-TW" dirty="0"/>
-              <a:t>There</a:t>
-            </a:r>
-            <a:r>
-              <a:rPr lang="zh-TW" altLang="en-US" dirty="0"/>
-              <a:t> </a:t>
-            </a:r>
-            <a:r>
-              <a:rPr lang="en-US" altLang="zh-TW" dirty="0"/>
-              <a:t>are</a:t>
-            </a:r>
-            <a:r>
-              <a:rPr lang="zh-TW" altLang="en-US" dirty="0"/>
-              <a:t> </a:t>
-            </a:r>
-            <a:r>
-              <a:rPr lang="en-US" altLang="zh-TW" dirty="0"/>
-              <a:t>several</a:t>
-            </a:r>
-            <a:r>
-              <a:rPr lang="zh-TW" altLang="en-US" dirty="0"/>
-              <a:t> </a:t>
-            </a:r>
-            <a:r>
-              <a:rPr lang="en-US" altLang="zh-TW" dirty="0"/>
-              <a:t>reasons</a:t>
-            </a:r>
-            <a:r>
-              <a:rPr lang="zh-TW" altLang="en-US" dirty="0"/>
-              <a:t> </a:t>
-            </a:r>
-            <a:r>
-              <a:rPr lang="en-US" altLang="zh-TW" dirty="0"/>
-              <a:t>why</a:t>
-            </a:r>
-            <a:r>
-              <a:rPr lang="zh-TW" altLang="en-US" dirty="0"/>
-              <a:t> </a:t>
-            </a:r>
-            <a:r>
-              <a:rPr lang="en-US" altLang="zh-TW" dirty="0"/>
-              <a:t>the</a:t>
-            </a:r>
-            <a:r>
-              <a:rPr lang="zh-TW" altLang="en-US" dirty="0"/>
-              <a:t> </a:t>
-            </a:r>
-            <a:r>
-              <a:rPr lang="en-US" altLang="zh-TW" dirty="0"/>
-              <a:t>execution</a:t>
-            </a:r>
-            <a:r>
-              <a:rPr lang="zh-TW" altLang="en-US" dirty="0"/>
-              <a:t> </a:t>
-            </a:r>
-            <a:r>
-              <a:rPr lang="en-US" altLang="zh-TW" dirty="0"/>
-              <a:t>time</a:t>
-            </a:r>
-            <a:r>
-              <a:rPr lang="zh-TW" altLang="en-US" dirty="0"/>
-              <a:t> </a:t>
-            </a:r>
-            <a:r>
-              <a:rPr lang="en-US" altLang="zh-TW" dirty="0"/>
-              <a:t>of</a:t>
-            </a:r>
-            <a:r>
-              <a:rPr lang="zh-TW" altLang="en-US" dirty="0"/>
-              <a:t> </a:t>
-            </a:r>
-            <a:r>
-              <a:rPr lang="en-US" altLang="zh-TW" dirty="0"/>
-              <a:t>python</a:t>
-            </a:r>
-            <a:r>
-              <a:rPr lang="zh-TW" altLang="en-US" dirty="0"/>
-              <a:t> </a:t>
-            </a:r>
-            <a:r>
-              <a:rPr lang="en-US" altLang="zh-TW" dirty="0"/>
-              <a:t>is</a:t>
-            </a:r>
-            <a:r>
-              <a:rPr lang="zh-TW" altLang="en-US" dirty="0"/>
-              <a:t> </a:t>
-            </a:r>
-            <a:r>
-              <a:rPr lang="en-US" altLang="zh-TW" dirty="0"/>
-              <a:t>longer</a:t>
-            </a:r>
-            <a:r>
-              <a:rPr lang="zh-TW" altLang="en-US" dirty="0"/>
-              <a:t> </a:t>
-            </a:r>
-            <a:r>
-              <a:rPr lang="en-US" altLang="zh-TW" dirty="0"/>
-              <a:t>than</a:t>
-            </a:r>
-            <a:r>
-              <a:rPr lang="zh-TW" altLang="en-US" dirty="0"/>
-              <a:t> </a:t>
-            </a:r>
-            <a:r>
-              <a:rPr lang="en-US" altLang="zh-TW" dirty="0"/>
-              <a:t>others</a:t>
-            </a:r>
-          </a:p>
-          <a:p>
-            <a:pPr lvl="1"/>
+            <a:pPr marL="0" indent="0">
+              <a:buNone/>
+            </a:pPr>
+            <a:endParaRPr lang="en-US" altLang="zh-TW" dirty="0"/>
+          </a:p>
+          <a:p>
             <a:r>
               <a:rPr lang="en-US" altLang="zh-TW" dirty="0"/>
               <a:t>Interpreted language</a:t>
             </a:r>
           </a:p>
           <a:p>
-            <a:pPr lvl="1"/>
             <a:r>
               <a:rPr lang="en-US" altLang="zh-TW" dirty="0"/>
               <a:t>Just-in-time compilation</a:t>
             </a:r>
           </a:p>
           <a:p>
-            <a:pPr lvl="1"/>
             <a:r>
               <a:rPr lang="en-US" altLang="zh-TW" dirty="0"/>
               <a:t>Global</a:t>
@@ -9942,7 +11158,7 @@
             </a:r>
             <a:r>
               <a:rPr lang="en-US" altLang="zh-TW" dirty="0"/>
-              <a:t>variables</a:t>
+              <a:t>variable</a:t>
             </a:r>
             <a:r>
               <a:rPr lang="zh-TW" altLang="en-US" dirty="0"/>
@@ -10388,10 +11604,10 @@
       </p:sp>
       <p:pic>
         <p:nvPicPr>
-          <p:cNvPr id="8" name="圖片 7">
-            <a:extLst>
-              <a:ext uri="{FF2B5EF4-FFF2-40B4-BE49-F238E27FC236}">
-                <a16:creationId xmlns:a16="http://schemas.microsoft.com/office/drawing/2014/main" id="{9732CD35-A543-4D46-A72E-C4CBFC277BD9}"/>
+          <p:cNvPr id="5" name="圖片 4">
+            <a:extLst>
+              <a:ext uri="{FF2B5EF4-FFF2-40B4-BE49-F238E27FC236}">
+                <a16:creationId xmlns:a16="http://schemas.microsoft.com/office/drawing/2014/main" id="{C2B14E24-04C0-4C33-923F-73A6C9CD68E1}"/>
               </a:ext>
             </a:extLst>
           </p:cNvPr>
@@ -10414,8 +11630,8 @@
         </p:blipFill>
         <p:spPr>
           <a:xfrm>
-            <a:off x="2504437" y="1334130"/>
-            <a:ext cx="7183126" cy="5387345"/>
+            <a:off x="2495970" y="1321430"/>
+            <a:ext cx="7200060" cy="5400045"/>
           </a:xfrm>
           <a:prstGeom prst="rect">
             <a:avLst/>
@@ -10569,7 +11785,7 @@
           <p:nvPr>
             <p:extLst>
               <p:ext uri="{D42A27DB-BD31-4B8C-83A1-F6EECF244321}">
-                <p14:modId xmlns:p14="http://schemas.microsoft.com/office/powerpoint/2010/main" val="556195479"/>
+                <p14:modId xmlns:p14="http://schemas.microsoft.com/office/powerpoint/2010/main" val="2784291323"/>
               </p:ext>
             </p:extLst>
           </p:nvPr>
@@ -10755,7 +11971,7 @@
                       <a:pPr algn="ctr"/>
                       <a:r>
                         <a:rPr lang="en-US" altLang="zh-TW" sz="2400" dirty="0"/>
-                        <a:t>9.77e-06</a:t>
+                        <a:t>7.41e-06</a:t>
                       </a:r>
                       <a:endParaRPr lang="zh-TW" altLang="en-US" sz="2400" dirty="0"/>
                     </a:p>
@@ -10825,7 +12041,7 @@
                       <a:pPr algn="ctr"/>
                       <a:r>
                         <a:rPr lang="en-US" altLang="zh-TW" sz="2400" dirty="0"/>
-                        <a:t>7.67e-05</a:t>
+                        <a:t>5.77e-05</a:t>
                       </a:r>
                       <a:endParaRPr lang="zh-TW" altLang="en-US" sz="2400" dirty="0"/>
                     </a:p>
@@ -10932,7 +12148,7 @@
                       </a:pPr>
                       <a:r>
                         <a:rPr lang="en-US" altLang="zh-TW" sz="2400" dirty="0"/>
-                        <a:t>7.89e-06</a:t>
+                        <a:t>3.07e-05</a:t>
                       </a:r>
                     </a:p>
                   </a:txBody>
@@ -11001,7 +12217,7 @@
                       <a:pPr algn="ctr"/>
                       <a:r>
                         <a:rPr lang="en-US" altLang="zh-TW" sz="2400" dirty="0"/>
-                        <a:t>5.58e-05</a:t>
+                        <a:t>1.67e-04</a:t>
                       </a:r>
                       <a:endParaRPr lang="zh-TW" altLang="en-US" sz="2400" dirty="0"/>
                     </a:p>
@@ -11050,7 +12266,7 @@
                       <a:pPr algn="ctr"/>
                       <a:r>
                         <a:rPr lang="en-US" altLang="zh-TW" sz="2400" dirty="0"/>
-                        <a:t>5.56e-02</a:t>
+                        <a:t>5.05e-02</a:t>
                       </a:r>
                       <a:endParaRPr lang="zh-TW" altLang="en-US" sz="2400" dirty="0"/>
                     </a:p>
@@ -11071,7 +12287,7 @@
                       <a:pPr algn="ctr"/>
                       <a:r>
                         <a:rPr lang="en-US" altLang="zh-TW" sz="2400" dirty="0"/>
-                        <a:t>5.52e-04</a:t>
+                        <a:t>1.57e-03</a:t>
                       </a:r>
                       <a:endParaRPr lang="zh-TW" altLang="en-US" sz="2400" dirty="0"/>
                     </a:p>

</xml_diff>